<commit_message>
updated Day 2 and 3 contents
</commit_message>
<xml_diff>
--- a/Day_2/Lectures/Day_2_Lecture_1_Data_Collection_Data_Preparation.pptx
+++ b/Day_2/Lectures/Day_2_Lecture_1_Data_Collection_Data_Preparation.pptx
@@ -31139,44 +31139,44 @@
 </file>
 
 <file path=ppt/theme/theme2.xml><?xml version="1.0" encoding="utf-8"?>
-<a:theme xmlns:a="http://schemas.openxmlformats.org/drawingml/2006/main" xmlns:r="http://schemas.openxmlformats.org/officeDocument/2006/relationships" name="Geometric">
+<a:theme xmlns:a="http://schemas.openxmlformats.org/drawingml/2006/main" xmlns:r="http://schemas.openxmlformats.org/officeDocument/2006/relationships" name="Simple Light">
   <a:themeElements>
-    <a:clrScheme name="Geometric">
+    <a:clrScheme name="Simple Light">
       <a:dk1>
-        <a:srgbClr val="2A3990"/>
+        <a:srgbClr val="000000"/>
       </a:dk1>
       <a:lt1>
         <a:srgbClr val="FFFFFF"/>
       </a:lt1>
       <a:dk2>
-        <a:srgbClr val="434343"/>
+        <a:srgbClr val="595959"/>
       </a:dk2>
       <a:lt2>
-        <a:srgbClr val="999999"/>
+        <a:srgbClr val="EEEEEE"/>
       </a:lt2>
       <a:accent1>
-        <a:srgbClr val="212D74"/>
+        <a:srgbClr val="4285F4"/>
       </a:accent1>
       <a:accent2>
-        <a:srgbClr val="3949AB"/>
+        <a:srgbClr val="212121"/>
       </a:accent2>
       <a:accent3>
-        <a:srgbClr val="9C254D"/>
+        <a:srgbClr val="78909C"/>
       </a:accent3>
       <a:accent4>
-        <a:srgbClr val="D23369"/>
+        <a:srgbClr val="FFAB40"/>
       </a:accent4>
       <a:accent5>
-        <a:srgbClr val="F06292"/>
+        <a:srgbClr val="0097A7"/>
       </a:accent5>
       <a:accent6>
-        <a:srgbClr val="7890CD"/>
+        <a:srgbClr val="EEFF41"/>
       </a:accent6>
       <a:hlink>
-        <a:srgbClr val="F06292"/>
+        <a:srgbClr val="0097A7"/>
       </a:hlink>
       <a:folHlink>
-        <a:srgbClr val="F06292"/>
+        <a:srgbClr val="0097A7"/>
       </a:folHlink>
     </a:clrScheme>
     <a:fontScheme name="Office">
@@ -31697,44 +31697,44 @@
 </file>
 
 <file path=ppt/theme/theme4.xml><?xml version="1.0" encoding="utf-8"?>
-<a:theme xmlns:a="http://schemas.openxmlformats.org/drawingml/2006/main" xmlns:r="http://schemas.openxmlformats.org/officeDocument/2006/relationships" name="Simple Light">
+<a:theme xmlns:a="http://schemas.openxmlformats.org/drawingml/2006/main" xmlns:r="http://schemas.openxmlformats.org/officeDocument/2006/relationships" name="Geometric">
   <a:themeElements>
-    <a:clrScheme name="Simple Light">
+    <a:clrScheme name="Geometric">
       <a:dk1>
-        <a:srgbClr val="000000"/>
+        <a:srgbClr val="2A3990"/>
       </a:dk1>
       <a:lt1>
         <a:srgbClr val="FFFFFF"/>
       </a:lt1>
       <a:dk2>
-        <a:srgbClr val="595959"/>
+        <a:srgbClr val="434343"/>
       </a:dk2>
       <a:lt2>
-        <a:srgbClr val="EEEEEE"/>
+        <a:srgbClr val="999999"/>
       </a:lt2>
       <a:accent1>
-        <a:srgbClr val="4285F4"/>
+        <a:srgbClr val="212D74"/>
       </a:accent1>
       <a:accent2>
-        <a:srgbClr val="212121"/>
+        <a:srgbClr val="3949AB"/>
       </a:accent2>
       <a:accent3>
-        <a:srgbClr val="78909C"/>
+        <a:srgbClr val="9C254D"/>
       </a:accent3>
       <a:accent4>
-        <a:srgbClr val="FFAB40"/>
+        <a:srgbClr val="D23369"/>
       </a:accent4>
       <a:accent5>
-        <a:srgbClr val="0097A7"/>
+        <a:srgbClr val="F06292"/>
       </a:accent5>
       <a:accent6>
-        <a:srgbClr val="EEFF41"/>
+        <a:srgbClr val="7890CD"/>
       </a:accent6>
       <a:hlink>
-        <a:srgbClr val="0097A7"/>
+        <a:srgbClr val="F06292"/>
       </a:hlink>
       <a:folHlink>
-        <a:srgbClr val="0097A7"/>
+        <a:srgbClr val="F06292"/>
       </a:folHlink>
     </a:clrScheme>
     <a:fontScheme name="Office">

</xml_diff>

<commit_message>
update Day_2 and Day_4 lectures
</commit_message>
<xml_diff>
--- a/Day_2/Lectures/Day_2_Lecture_1_Data_Collection_Data_Preparation.pptx
+++ b/Day_2/Lectures/Day_2_Lecture_1_Data_Collection_Data_Preparation.pptx
@@ -1784,7 +1784,7 @@
   <p:cSld>
     <p:spTree>
       <p:nvGrpSpPr>
-        <p:cNvPr id="314" name="Shape 314"/>
+        <p:cNvPr id="315" name="Shape 315"/>
         <p:cNvGrpSpPr/>
         <p:nvPr/>
       </p:nvGrpSpPr>
@@ -1798,7 +1798,7 @@
       </p:grpSpPr>
       <p:sp>
         <p:nvSpPr>
-          <p:cNvPr id="315" name="Google Shape;315;g110a238f71a_0_1:notes"/>
+          <p:cNvPr id="316" name="Google Shape;316;g110a238f71a_0_1:notes"/>
           <p:cNvSpPr/>
           <p:nvPr>
             <p:ph idx="2" type="sldImg"/>
@@ -1833,7 +1833,7 @@
       </p:sp>
       <p:sp>
         <p:nvSpPr>
-          <p:cNvPr id="316" name="Google Shape;316;g110a238f71a_0_1:notes"/>
+          <p:cNvPr id="317" name="Google Shape;317;g110a238f71a_0_1:notes"/>
           <p:cNvSpPr txBox="1"/>
           <p:nvPr>
             <p:ph idx="1" type="body"/>
@@ -1883,7 +1883,7 @@
   <p:cSld>
     <p:spTree>
       <p:nvGrpSpPr>
-        <p:cNvPr id="324" name="Shape 324"/>
+        <p:cNvPr id="325" name="Shape 325"/>
         <p:cNvGrpSpPr/>
         <p:nvPr/>
       </p:nvGrpSpPr>
@@ -1897,7 +1897,7 @@
       </p:grpSpPr>
       <p:sp>
         <p:nvSpPr>
-          <p:cNvPr id="325" name="Google Shape;325;g110a238f71a_0_13:notes"/>
+          <p:cNvPr id="326" name="Google Shape;326;g110a238f71a_0_13:notes"/>
           <p:cNvSpPr/>
           <p:nvPr>
             <p:ph idx="2" type="sldImg"/>
@@ -1932,7 +1932,7 @@
       </p:sp>
       <p:sp>
         <p:nvSpPr>
-          <p:cNvPr id="326" name="Google Shape;326;g110a238f71a_0_13:notes"/>
+          <p:cNvPr id="327" name="Google Shape;327;g110a238f71a_0_13:notes"/>
           <p:cNvSpPr txBox="1"/>
           <p:nvPr>
             <p:ph idx="1" type="body"/>
@@ -1982,7 +1982,7 @@
   <p:cSld>
     <p:spTree>
       <p:nvGrpSpPr>
-        <p:cNvPr id="334" name="Shape 334"/>
+        <p:cNvPr id="335" name="Shape 335"/>
         <p:cNvGrpSpPr/>
         <p:nvPr/>
       </p:nvGrpSpPr>
@@ -1996,7 +1996,7 @@
       </p:grpSpPr>
       <p:sp>
         <p:nvSpPr>
-          <p:cNvPr id="335" name="Google Shape;335;g11cb97c2611_0_192:notes"/>
+          <p:cNvPr id="336" name="Google Shape;336;g11cb97c2611_0_192:notes"/>
           <p:cNvSpPr/>
           <p:nvPr>
             <p:ph idx="2" type="sldImg"/>
@@ -2031,7 +2031,7 @@
       </p:sp>
       <p:sp>
         <p:nvSpPr>
-          <p:cNvPr id="336" name="Google Shape;336;g11cb97c2611_0_192:notes"/>
+          <p:cNvPr id="337" name="Google Shape;337;g11cb97c2611_0_192:notes"/>
           <p:cNvSpPr txBox="1"/>
           <p:nvPr>
             <p:ph idx="1" type="body"/>
@@ -2081,7 +2081,7 @@
   <p:cSld>
     <p:spTree>
       <p:nvGrpSpPr>
-        <p:cNvPr id="344" name="Shape 344"/>
+        <p:cNvPr id="345" name="Shape 345"/>
         <p:cNvGrpSpPr/>
         <p:nvPr/>
       </p:nvGrpSpPr>
@@ -2095,7 +2095,7 @@
       </p:grpSpPr>
       <p:sp>
         <p:nvSpPr>
-          <p:cNvPr id="345" name="Google Shape;345;g110a238f71a_0_25:notes"/>
+          <p:cNvPr id="346" name="Google Shape;346;g110a238f71a_0_25:notes"/>
           <p:cNvSpPr/>
           <p:nvPr>
             <p:ph idx="2" type="sldImg"/>
@@ -2130,7 +2130,7 @@
       </p:sp>
       <p:sp>
         <p:nvSpPr>
-          <p:cNvPr id="346" name="Google Shape;346;g110a238f71a_0_25:notes"/>
+          <p:cNvPr id="347" name="Google Shape;347;g110a238f71a_0_25:notes"/>
           <p:cNvSpPr txBox="1"/>
           <p:nvPr>
             <p:ph idx="1" type="body"/>
@@ -2279,7 +2279,7 @@
   <p:cSld>
     <p:spTree>
       <p:nvGrpSpPr>
-        <p:cNvPr id="354" name="Shape 354"/>
+        <p:cNvPr id="355" name="Shape 355"/>
         <p:cNvGrpSpPr/>
         <p:nvPr/>
       </p:nvGrpSpPr>
@@ -2293,7 +2293,7 @@
       </p:grpSpPr>
       <p:sp>
         <p:nvSpPr>
-          <p:cNvPr id="355" name="Google Shape;355;g110a238f71a_0_44:notes"/>
+          <p:cNvPr id="356" name="Google Shape;356;g110a238f71a_0_44:notes"/>
           <p:cNvSpPr/>
           <p:nvPr>
             <p:ph idx="2" type="sldImg"/>
@@ -2328,7 +2328,7 @@
       </p:sp>
       <p:sp>
         <p:nvSpPr>
-          <p:cNvPr id="356" name="Google Shape;356;g110a238f71a_0_44:notes"/>
+          <p:cNvPr id="357" name="Google Shape;357;g110a238f71a_0_44:notes"/>
           <p:cNvSpPr txBox="1"/>
           <p:nvPr>
             <p:ph idx="1" type="body"/>
@@ -2378,7 +2378,7 @@
   <p:cSld>
     <p:spTree>
       <p:nvGrpSpPr>
-        <p:cNvPr id="365" name="Shape 365"/>
+        <p:cNvPr id="366" name="Shape 366"/>
         <p:cNvGrpSpPr/>
         <p:nvPr/>
       </p:nvGrpSpPr>
@@ -2392,7 +2392,7 @@
       </p:grpSpPr>
       <p:sp>
         <p:nvSpPr>
-          <p:cNvPr id="366" name="Google Shape;366;g110a238f71a_0_34:notes"/>
+          <p:cNvPr id="367" name="Google Shape;367;g110a238f71a_0_34:notes"/>
           <p:cNvSpPr/>
           <p:nvPr>
             <p:ph idx="2" type="sldImg"/>
@@ -2427,7 +2427,7 @@
       </p:sp>
       <p:sp>
         <p:nvSpPr>
-          <p:cNvPr id="367" name="Google Shape;367;g110a238f71a_0_34:notes"/>
+          <p:cNvPr id="368" name="Google Shape;368;g110a238f71a_0_34:notes"/>
           <p:cNvSpPr txBox="1"/>
           <p:nvPr>
             <p:ph idx="1" type="body"/>
@@ -2637,7 +2637,7 @@
   <p:cSld>
     <p:spTree>
       <p:nvGrpSpPr>
-        <p:cNvPr id="377" name="Shape 377"/>
+        <p:cNvPr id="378" name="Shape 378"/>
         <p:cNvGrpSpPr/>
         <p:nvPr/>
       </p:nvGrpSpPr>
@@ -2651,7 +2651,7 @@
       </p:grpSpPr>
       <p:sp>
         <p:nvSpPr>
-          <p:cNvPr id="378" name="Google Shape;378;g110a238f71a_0_54:notes"/>
+          <p:cNvPr id="379" name="Google Shape;379;g110a238f71a_0_54:notes"/>
           <p:cNvSpPr/>
           <p:nvPr>
             <p:ph idx="2" type="sldImg"/>
@@ -2686,7 +2686,7 @@
       </p:sp>
       <p:sp>
         <p:nvSpPr>
-          <p:cNvPr id="379" name="Google Shape;379;g110a238f71a_0_54:notes"/>
+          <p:cNvPr id="380" name="Google Shape;380;g110a238f71a_0_54:notes"/>
           <p:cNvSpPr txBox="1"/>
           <p:nvPr>
             <p:ph idx="1" type="body"/>
@@ -3006,7 +3006,7 @@
   <p:cSld>
     <p:spTree>
       <p:nvGrpSpPr>
-        <p:cNvPr id="388" name="Shape 388"/>
+        <p:cNvPr id="389" name="Shape 389"/>
         <p:cNvGrpSpPr/>
         <p:nvPr/>
       </p:nvGrpSpPr>
@@ -3020,7 +3020,7 @@
       </p:grpSpPr>
       <p:sp>
         <p:nvSpPr>
-          <p:cNvPr id="389" name="Google Shape;389;g110a238f71a_0_63:notes"/>
+          <p:cNvPr id="390" name="Google Shape;390;g110a238f71a_0_63:notes"/>
           <p:cNvSpPr/>
           <p:nvPr>
             <p:ph idx="2" type="sldImg"/>
@@ -3055,7 +3055,7 @@
       </p:sp>
       <p:sp>
         <p:nvSpPr>
-          <p:cNvPr id="390" name="Google Shape;390;g110a238f71a_0_63:notes"/>
+          <p:cNvPr id="391" name="Google Shape;391;g110a238f71a_0_63:notes"/>
           <p:cNvSpPr txBox="1"/>
           <p:nvPr>
             <p:ph idx="1" type="body"/>
@@ -3105,7 +3105,7 @@
   <p:cSld>
     <p:spTree>
       <p:nvGrpSpPr>
-        <p:cNvPr id="398" name="Shape 398"/>
+        <p:cNvPr id="399" name="Shape 399"/>
         <p:cNvGrpSpPr/>
         <p:nvPr/>
       </p:nvGrpSpPr>
@@ -3119,7 +3119,7 @@
       </p:grpSpPr>
       <p:sp>
         <p:nvSpPr>
-          <p:cNvPr id="399" name="Google Shape;399;g11ba22b7cc1_0_61:notes"/>
+          <p:cNvPr id="400" name="Google Shape;400;g11ba22b7cc1_0_61:notes"/>
           <p:cNvSpPr/>
           <p:nvPr>
             <p:ph idx="2" type="sldImg"/>
@@ -3154,7 +3154,7 @@
       </p:sp>
       <p:sp>
         <p:nvSpPr>
-          <p:cNvPr id="400" name="Google Shape;400;g11ba22b7cc1_0_61:notes"/>
+          <p:cNvPr id="401" name="Google Shape;401;g11ba22b7cc1_0_61:notes"/>
           <p:cNvSpPr txBox="1"/>
           <p:nvPr>
             <p:ph idx="1" type="body"/>
@@ -3204,7 +3204,7 @@
   <p:cSld>
     <p:spTree>
       <p:nvGrpSpPr>
-        <p:cNvPr id="417" name="Shape 417"/>
+        <p:cNvPr id="418" name="Shape 418"/>
         <p:cNvGrpSpPr/>
         <p:nvPr/>
       </p:nvGrpSpPr>
@@ -3218,7 +3218,7 @@
       </p:grpSpPr>
       <p:sp>
         <p:nvSpPr>
-          <p:cNvPr id="418" name="Google Shape;418;g110c9cc373d_0_0:notes"/>
+          <p:cNvPr id="419" name="Google Shape;419;g110c9cc373d_0_0:notes"/>
           <p:cNvSpPr/>
           <p:nvPr>
             <p:ph idx="2" type="sldImg"/>
@@ -3253,7 +3253,7 @@
       </p:sp>
       <p:sp>
         <p:nvSpPr>
-          <p:cNvPr id="419" name="Google Shape;419;g110c9cc373d_0_0:notes"/>
+          <p:cNvPr id="420" name="Google Shape;420;g110c9cc373d_0_0:notes"/>
           <p:cNvSpPr txBox="1"/>
           <p:nvPr>
             <p:ph idx="1" type="body"/>
@@ -3391,7 +3391,7 @@
   <p:cSld>
     <p:spTree>
       <p:nvGrpSpPr>
-        <p:cNvPr id="426" name="Shape 426"/>
+        <p:cNvPr id="427" name="Shape 427"/>
         <p:cNvGrpSpPr/>
         <p:nvPr/>
       </p:nvGrpSpPr>
@@ -3405,7 +3405,7 @@
       </p:grpSpPr>
       <p:sp>
         <p:nvSpPr>
-          <p:cNvPr id="427" name="Google Shape;427;g11c1ae6140b_0_17:notes"/>
+          <p:cNvPr id="428" name="Google Shape;428;g11c1ae6140b_0_17:notes"/>
           <p:cNvSpPr/>
           <p:nvPr>
             <p:ph idx="2" type="sldImg"/>
@@ -3440,7 +3440,7 @@
       </p:sp>
       <p:sp>
         <p:nvSpPr>
-          <p:cNvPr id="428" name="Google Shape;428;g11c1ae6140b_0_17:notes"/>
+          <p:cNvPr id="429" name="Google Shape;429;g11c1ae6140b_0_17:notes"/>
           <p:cNvSpPr txBox="1"/>
           <p:nvPr>
             <p:ph idx="1" type="body"/>
@@ -23397,7 +23397,7 @@
         </p:blipFill>
         <p:spPr>
           <a:xfrm>
-            <a:off x="5391386" y="132925"/>
+            <a:off x="5391386" y="0"/>
             <a:ext cx="3536038" cy="4577375"/>
           </a:xfrm>
           <a:prstGeom prst="rect">
@@ -23409,6 +23409,58 @@
           </a:ln>
         </p:spPr>
       </p:pic>
+      <p:sp>
+        <p:nvSpPr>
+          <p:cNvPr id="314" name="Google Shape;314;p51"/>
+          <p:cNvSpPr txBox="1"/>
+          <p:nvPr/>
+        </p:nvSpPr>
+        <p:spPr>
+          <a:xfrm>
+            <a:off x="6606900" y="4422300"/>
+            <a:ext cx="2537100" cy="307800"/>
+          </a:xfrm>
+          <a:prstGeom prst="rect">
+            <a:avLst/>
+          </a:prstGeom>
+          <a:noFill/>
+          <a:ln>
+            <a:noFill/>
+          </a:ln>
+        </p:spPr>
+        <p:txBody>
+          <a:bodyPr anchorCtr="0" anchor="t" bIns="91425" lIns="91425" spcFirstLastPara="1" rIns="91425" wrap="square" tIns="91425">
+            <a:spAutoFit/>
+          </a:bodyPr>
+          <a:lstStyle/>
+          <a:p>
+            <a:pPr indent="0" lvl="0" marL="0" rtl="0" algn="r">
+              <a:spcBef>
+                <a:spcPts val="0"/>
+              </a:spcBef>
+              <a:spcAft>
+                <a:spcPts val="0"/>
+              </a:spcAft>
+              <a:buNone/>
+            </a:pPr>
+            <a:r>
+              <a:rPr i="1" lang="en" sz="800">
+                <a:latin typeface="Roboto"/>
+                <a:ea typeface="Roboto"/>
+                <a:cs typeface="Roboto"/>
+                <a:sym typeface="Roboto"/>
+              </a:rPr>
+              <a:t>Created in Canva  by C. Arighi</a:t>
+            </a:r>
+            <a:endParaRPr i="1" sz="800">
+              <a:latin typeface="Roboto"/>
+              <a:ea typeface="Roboto"/>
+              <a:cs typeface="Roboto"/>
+              <a:sym typeface="Roboto"/>
+            </a:endParaRPr>
+          </a:p>
+        </p:txBody>
+      </p:sp>
     </p:spTree>
   </p:cSld>
   <p:clrMapOvr>
@@ -23422,7 +23474,7 @@
   <p:cSld>
     <p:spTree>
       <p:nvGrpSpPr>
-        <p:cNvPr id="317" name="Shape 317"/>
+        <p:cNvPr id="318" name="Shape 318"/>
         <p:cNvGrpSpPr/>
         <p:nvPr/>
       </p:nvGrpSpPr>
@@ -23436,7 +23488,7 @@
       </p:grpSpPr>
       <p:pic>
         <p:nvPicPr>
-          <p:cNvPr id="318" name="Google Shape;318;p52"/>
+          <p:cNvPr id="319" name="Google Shape;319;p52"/>
           <p:cNvPicPr preferRelativeResize="0"/>
           <p:nvPr/>
         </p:nvPicPr>
@@ -23464,7 +23516,7 @@
       </p:pic>
       <p:sp>
         <p:nvSpPr>
-          <p:cNvPr id="319" name="Google Shape;319;p52"/>
+          <p:cNvPr id="320" name="Google Shape;320;p52"/>
           <p:cNvSpPr txBox="1"/>
           <p:nvPr>
             <p:ph type="title"/>
@@ -23512,7 +23564,7 @@
       </p:sp>
       <p:sp>
         <p:nvSpPr>
-          <p:cNvPr id="320" name="Google Shape;320;p52"/>
+          <p:cNvPr id="321" name="Google Shape;321;p52"/>
           <p:cNvSpPr txBox="1"/>
           <p:nvPr>
             <p:ph idx="12" type="sldNum"/>
@@ -23560,7 +23612,7 @@
       </p:sp>
       <p:sp>
         <p:nvSpPr>
-          <p:cNvPr id="321" name="Google Shape;321;p52"/>
+          <p:cNvPr id="322" name="Google Shape;322;p52"/>
           <p:cNvSpPr/>
           <p:nvPr/>
         </p:nvSpPr>
@@ -23678,7 +23730,7 @@
       </p:sp>
       <p:pic>
         <p:nvPicPr>
-          <p:cNvPr id="322" name="Google Shape;322;p52"/>
+          <p:cNvPr id="323" name="Google Shape;323;p52"/>
           <p:cNvPicPr preferRelativeResize="0"/>
           <p:nvPr/>
         </p:nvPicPr>
@@ -23706,7 +23758,7 @@
       </p:pic>
       <p:sp>
         <p:nvSpPr>
-          <p:cNvPr id="323" name="Google Shape;323;p52"/>
+          <p:cNvPr id="324" name="Google Shape;324;p52"/>
           <p:cNvSpPr txBox="1"/>
           <p:nvPr/>
         </p:nvSpPr>
@@ -23822,7 +23874,7 @@
   <p:cSld>
     <p:spTree>
       <p:nvGrpSpPr>
-        <p:cNvPr id="327" name="Shape 327"/>
+        <p:cNvPr id="328" name="Shape 328"/>
         <p:cNvGrpSpPr/>
         <p:nvPr/>
       </p:nvGrpSpPr>
@@ -23836,7 +23888,7 @@
       </p:grpSpPr>
       <p:pic>
         <p:nvPicPr>
-          <p:cNvPr id="328" name="Google Shape;328;p53"/>
+          <p:cNvPr id="329" name="Google Shape;329;p53"/>
           <p:cNvPicPr preferRelativeResize="0"/>
           <p:nvPr/>
         </p:nvPicPr>
@@ -23864,7 +23916,7 @@
       </p:pic>
       <p:sp>
         <p:nvSpPr>
-          <p:cNvPr id="329" name="Google Shape;329;p53"/>
+          <p:cNvPr id="330" name="Google Shape;330;p53"/>
           <p:cNvSpPr txBox="1"/>
           <p:nvPr>
             <p:ph type="title"/>
@@ -23960,7 +24012,7 @@
       </p:sp>
       <p:sp>
         <p:nvSpPr>
-          <p:cNvPr id="330" name="Google Shape;330;p53"/>
+          <p:cNvPr id="331" name="Google Shape;331;p53"/>
           <p:cNvSpPr txBox="1"/>
           <p:nvPr>
             <p:ph idx="12" type="sldNum"/>
@@ -24008,14 +24060,14 @@
       </p:sp>
       <p:sp>
         <p:nvSpPr>
-          <p:cNvPr id="331" name="Google Shape;331;p53"/>
+          <p:cNvPr id="332" name="Google Shape;332;p53"/>
           <p:cNvSpPr txBox="1"/>
           <p:nvPr/>
         </p:nvSpPr>
         <p:spPr>
           <a:xfrm>
             <a:off x="1526700" y="2350350"/>
-            <a:ext cx="6222300" cy="997500"/>
+            <a:ext cx="6222300" cy="1254000"/>
           </a:xfrm>
           <a:prstGeom prst="rect">
             <a:avLst/>
@@ -24056,7 +24108,7 @@
                 <a:spcPct val="115000"/>
               </a:lnSpc>
               <a:spcBef>
-                <a:spcPts val="0"/>
+                <a:spcPts val="1000"/>
               </a:spcBef>
               <a:spcAft>
                 <a:spcPts val="0"/>
@@ -24076,10 +24128,10 @@
                 <a:spcPct val="115000"/>
               </a:lnSpc>
               <a:spcBef>
-                <a:spcPts val="0"/>
-              </a:spcBef>
-              <a:spcAft>
-                <a:spcPts val="0"/>
+                <a:spcPts val="1000"/>
+              </a:spcBef>
+              <a:spcAft>
+                <a:spcPts val="1000"/>
               </a:spcAft>
               <a:buSzPts val="1600"/>
               <a:buChar char="●"/>
@@ -24094,13 +24146,13 @@
       </p:sp>
       <p:sp>
         <p:nvSpPr>
-          <p:cNvPr id="332" name="Google Shape;332;p53"/>
+          <p:cNvPr id="333" name="Google Shape;333;p53"/>
           <p:cNvSpPr/>
           <p:nvPr/>
         </p:nvSpPr>
         <p:spPr>
           <a:xfrm>
-            <a:off x="1802375" y="1102600"/>
+            <a:off x="1345175" y="1102600"/>
             <a:ext cx="6325500" cy="687900"/>
           </a:xfrm>
           <a:prstGeom prst="roundRect">
@@ -24153,7 +24205,7 @@
       </p:sp>
       <p:pic>
         <p:nvPicPr>
-          <p:cNvPr id="333" name="Google Shape;333;p53"/>
+          <p:cNvPr id="334" name="Google Shape;334;p53"/>
           <p:cNvPicPr preferRelativeResize="0"/>
           <p:nvPr/>
         </p:nvPicPr>
@@ -24167,7 +24219,7 @@
         </p:blipFill>
         <p:spPr>
           <a:xfrm>
-            <a:off x="1871150" y="1200500"/>
+            <a:off x="1413950" y="1200500"/>
             <a:ext cx="766300" cy="492125"/>
           </a:xfrm>
           <a:prstGeom prst="rect">
@@ -24192,7 +24244,7 @@
   <p:cSld>
     <p:spTree>
       <p:nvGrpSpPr>
-        <p:cNvPr id="337" name="Shape 337"/>
+        <p:cNvPr id="338" name="Shape 338"/>
         <p:cNvGrpSpPr/>
         <p:nvPr/>
       </p:nvGrpSpPr>
@@ -24206,7 +24258,7 @@
       </p:grpSpPr>
       <p:pic>
         <p:nvPicPr>
-          <p:cNvPr id="338" name="Google Shape;338;p54"/>
+          <p:cNvPr id="339" name="Google Shape;339;p54"/>
           <p:cNvPicPr preferRelativeResize="0"/>
           <p:nvPr/>
         </p:nvPicPr>
@@ -24234,7 +24286,7 @@
       </p:pic>
       <p:sp>
         <p:nvSpPr>
-          <p:cNvPr id="339" name="Google Shape;339;p54"/>
+          <p:cNvPr id="340" name="Google Shape;340;p54"/>
           <p:cNvSpPr txBox="1"/>
           <p:nvPr>
             <p:ph type="title"/>
@@ -24282,7 +24334,7 @@
       </p:sp>
       <p:sp>
         <p:nvSpPr>
-          <p:cNvPr id="340" name="Google Shape;340;p54"/>
+          <p:cNvPr id="341" name="Google Shape;341;p54"/>
           <p:cNvSpPr txBox="1"/>
           <p:nvPr>
             <p:ph idx="12" type="sldNum"/>
@@ -24330,7 +24382,7 @@
       </p:sp>
       <p:sp>
         <p:nvSpPr>
-          <p:cNvPr id="341" name="Google Shape;341;p54"/>
+          <p:cNvPr id="342" name="Google Shape;342;p54"/>
           <p:cNvSpPr txBox="1"/>
           <p:nvPr/>
         </p:nvSpPr>
@@ -24534,7 +24586,7 @@
       </p:sp>
       <p:pic>
         <p:nvPicPr>
-          <p:cNvPr id="342" name="Google Shape;342;p54"/>
+          <p:cNvPr id="343" name="Google Shape;343;p54"/>
           <p:cNvPicPr preferRelativeResize="0"/>
           <p:nvPr/>
         </p:nvPicPr>
@@ -24562,7 +24614,7 @@
       </p:pic>
       <p:sp>
         <p:nvSpPr>
-          <p:cNvPr id="343" name="Google Shape;343;p54"/>
+          <p:cNvPr id="344" name="Google Shape;344;p54"/>
           <p:cNvSpPr txBox="1"/>
           <p:nvPr/>
         </p:nvSpPr>
@@ -24628,7 +24680,7 @@
   <p:cSld>
     <p:spTree>
       <p:nvGrpSpPr>
-        <p:cNvPr id="347" name="Shape 347"/>
+        <p:cNvPr id="348" name="Shape 348"/>
         <p:cNvGrpSpPr/>
         <p:nvPr/>
       </p:nvGrpSpPr>
@@ -24642,7 +24694,7 @@
       </p:grpSpPr>
       <p:pic>
         <p:nvPicPr>
-          <p:cNvPr id="348" name="Google Shape;348;p55"/>
+          <p:cNvPr id="349" name="Google Shape;349;p55"/>
           <p:cNvPicPr preferRelativeResize="0"/>
           <p:nvPr/>
         </p:nvPicPr>
@@ -24670,7 +24722,7 @@
       </p:pic>
       <p:sp>
         <p:nvSpPr>
-          <p:cNvPr id="349" name="Google Shape;349;p55"/>
+          <p:cNvPr id="350" name="Google Shape;350;p55"/>
           <p:cNvSpPr txBox="1"/>
           <p:nvPr>
             <p:ph type="title"/>
@@ -24718,7 +24770,7 @@
       </p:sp>
       <p:sp>
         <p:nvSpPr>
-          <p:cNvPr id="350" name="Google Shape;350;p55"/>
+          <p:cNvPr id="351" name="Google Shape;351;p55"/>
           <p:cNvSpPr txBox="1"/>
           <p:nvPr>
             <p:ph idx="12" type="sldNum"/>
@@ -24766,7 +24818,7 @@
       </p:sp>
       <p:sp>
         <p:nvSpPr>
-          <p:cNvPr id="351" name="Google Shape;351;p55"/>
+          <p:cNvPr id="352" name="Google Shape;352;p55"/>
           <p:cNvSpPr txBox="1"/>
           <p:nvPr/>
         </p:nvSpPr>
@@ -24851,7 +24903,7 @@
       </p:sp>
       <p:pic>
         <p:nvPicPr>
-          <p:cNvPr id="352" name="Google Shape;352;p55"/>
+          <p:cNvPr id="353" name="Google Shape;353;p55"/>
           <p:cNvPicPr preferRelativeResize="0"/>
           <p:nvPr/>
         </p:nvPicPr>
@@ -24879,7 +24931,7 @@
       </p:pic>
       <p:sp>
         <p:nvSpPr>
-          <p:cNvPr id="353" name="Google Shape;353;p55"/>
+          <p:cNvPr id="354" name="Google Shape;354;p55"/>
           <p:cNvSpPr txBox="1"/>
           <p:nvPr/>
         </p:nvSpPr>
@@ -25274,7 +25326,7 @@
   <p:cSld>
     <p:spTree>
       <p:nvGrpSpPr>
-        <p:cNvPr id="357" name="Shape 357"/>
+        <p:cNvPr id="358" name="Shape 358"/>
         <p:cNvGrpSpPr/>
         <p:nvPr/>
       </p:nvGrpSpPr>
@@ -25288,7 +25340,7 @@
       </p:grpSpPr>
       <p:pic>
         <p:nvPicPr>
-          <p:cNvPr id="358" name="Google Shape;358;p56"/>
+          <p:cNvPr id="359" name="Google Shape;359;p56"/>
           <p:cNvPicPr preferRelativeResize="0"/>
           <p:nvPr/>
         </p:nvPicPr>
@@ -25316,7 +25368,7 @@
       </p:pic>
       <p:sp>
         <p:nvSpPr>
-          <p:cNvPr id="359" name="Google Shape;359;p56"/>
+          <p:cNvPr id="360" name="Google Shape;360;p56"/>
           <p:cNvSpPr txBox="1"/>
           <p:nvPr>
             <p:ph type="title"/>
@@ -25364,7 +25416,7 @@
       </p:sp>
       <p:sp>
         <p:nvSpPr>
-          <p:cNvPr id="360" name="Google Shape;360;p56"/>
+          <p:cNvPr id="361" name="Google Shape;361;p56"/>
           <p:cNvSpPr txBox="1"/>
           <p:nvPr>
             <p:ph idx="12" type="sldNum"/>
@@ -25412,7 +25464,7 @@
       </p:sp>
       <p:sp>
         <p:nvSpPr>
-          <p:cNvPr id="361" name="Google Shape;361;p56"/>
+          <p:cNvPr id="362" name="Google Shape;362;p56"/>
           <p:cNvSpPr txBox="1"/>
           <p:nvPr/>
         </p:nvSpPr>
@@ -25478,7 +25530,7 @@
       </p:sp>
       <p:sp>
         <p:nvSpPr>
-          <p:cNvPr id="362" name="Google Shape;362;p56"/>
+          <p:cNvPr id="363" name="Google Shape;363;p56"/>
           <p:cNvSpPr txBox="1"/>
           <p:nvPr/>
         </p:nvSpPr>
@@ -25530,7 +25582,7 @@
       </p:sp>
       <p:pic>
         <p:nvPicPr>
-          <p:cNvPr id="363" name="Google Shape;363;p56"/>
+          <p:cNvPr id="364" name="Google Shape;364;p56"/>
           <p:cNvPicPr preferRelativeResize="0"/>
           <p:nvPr/>
         </p:nvPicPr>
@@ -25558,7 +25610,7 @@
       </p:pic>
       <p:pic>
         <p:nvPicPr>
-          <p:cNvPr id="364" name="Google Shape;364;p56"/>
+          <p:cNvPr id="365" name="Google Shape;365;p56"/>
           <p:cNvPicPr preferRelativeResize="0"/>
           <p:nvPr/>
         </p:nvPicPr>
@@ -25597,7 +25649,7 @@
   <p:cSld>
     <p:spTree>
       <p:nvGrpSpPr>
-        <p:cNvPr id="368" name="Shape 368"/>
+        <p:cNvPr id="369" name="Shape 369"/>
         <p:cNvGrpSpPr/>
         <p:nvPr/>
       </p:nvGrpSpPr>
@@ -25611,7 +25663,7 @@
       </p:grpSpPr>
       <p:pic>
         <p:nvPicPr>
-          <p:cNvPr id="369" name="Google Shape;369;p57"/>
+          <p:cNvPr id="370" name="Google Shape;370;p57"/>
           <p:cNvPicPr preferRelativeResize="0"/>
           <p:nvPr/>
         </p:nvPicPr>
@@ -25639,7 +25691,7 @@
       </p:pic>
       <p:sp>
         <p:nvSpPr>
-          <p:cNvPr id="370" name="Google Shape;370;p57"/>
+          <p:cNvPr id="371" name="Google Shape;371;p57"/>
           <p:cNvSpPr txBox="1"/>
           <p:nvPr>
             <p:ph type="title"/>
@@ -25660,7 +25712,7 @@
           </a:bodyPr>
           <a:lstStyle/>
           <a:p>
-            <a:pPr indent="0" lvl="0" marL="0" rtl="0" algn="l">
+            <a:pPr indent="0" lvl="0" marL="0" rtl="0" algn="ctr">
               <a:spcBef>
                 <a:spcPts val="0"/>
               </a:spcBef>
@@ -25687,7 +25739,7 @@
       </p:sp>
       <p:sp>
         <p:nvSpPr>
-          <p:cNvPr id="371" name="Google Shape;371;p57"/>
+          <p:cNvPr id="372" name="Google Shape;372;p57"/>
           <p:cNvSpPr txBox="1"/>
           <p:nvPr>
             <p:ph idx="12" type="sldNum"/>
@@ -25735,7 +25787,7 @@
       </p:sp>
       <p:sp>
         <p:nvSpPr>
-          <p:cNvPr id="372" name="Google Shape;372;p57"/>
+          <p:cNvPr id="373" name="Google Shape;373;p57"/>
           <p:cNvSpPr txBox="1"/>
           <p:nvPr/>
         </p:nvSpPr>
@@ -25819,7 +25871,7 @@
       </p:sp>
       <p:pic>
         <p:nvPicPr>
-          <p:cNvPr id="373" name="Google Shape;373;p57"/>
+          <p:cNvPr id="374" name="Google Shape;374;p57"/>
           <p:cNvPicPr preferRelativeResize="0"/>
           <p:nvPr/>
         </p:nvPicPr>
@@ -25847,7 +25899,7 @@
       </p:pic>
       <p:sp>
         <p:nvSpPr>
-          <p:cNvPr id="374" name="Google Shape;374;p57"/>
+          <p:cNvPr id="375" name="Google Shape;375;p57"/>
           <p:cNvSpPr txBox="1"/>
           <p:nvPr/>
         </p:nvSpPr>
@@ -25899,7 +25951,7 @@
       </p:sp>
       <p:sp>
         <p:nvSpPr>
-          <p:cNvPr id="375" name="Google Shape;375;p57"/>
+          <p:cNvPr id="376" name="Google Shape;376;p57"/>
           <p:cNvSpPr/>
           <p:nvPr/>
         </p:nvSpPr>
@@ -26020,7 +26072,7 @@
       </p:sp>
       <p:pic>
         <p:nvPicPr>
-          <p:cNvPr id="376" name="Google Shape;376;p57"/>
+          <p:cNvPr id="377" name="Google Shape;377;p57"/>
           <p:cNvPicPr preferRelativeResize="0"/>
           <p:nvPr/>
         </p:nvPicPr>
@@ -26059,7 +26111,7 @@
   <p:cSld>
     <p:spTree>
       <p:nvGrpSpPr>
-        <p:cNvPr id="380" name="Shape 380"/>
+        <p:cNvPr id="381" name="Shape 381"/>
         <p:cNvGrpSpPr/>
         <p:nvPr/>
       </p:nvGrpSpPr>
@@ -26073,7 +26125,7 @@
       </p:grpSpPr>
       <p:pic>
         <p:nvPicPr>
-          <p:cNvPr id="381" name="Google Shape;381;p58"/>
+          <p:cNvPr id="382" name="Google Shape;382;p58"/>
           <p:cNvPicPr preferRelativeResize="0"/>
           <p:nvPr/>
         </p:nvPicPr>
@@ -26101,7 +26153,7 @@
       </p:pic>
       <p:sp>
         <p:nvSpPr>
-          <p:cNvPr id="382" name="Google Shape;382;p58"/>
+          <p:cNvPr id="383" name="Google Shape;383;p58"/>
           <p:cNvSpPr txBox="1"/>
           <p:nvPr>
             <p:ph type="title"/>
@@ -26149,7 +26201,7 @@
       </p:sp>
       <p:sp>
         <p:nvSpPr>
-          <p:cNvPr id="383" name="Google Shape;383;p58"/>
+          <p:cNvPr id="384" name="Google Shape;384;p58"/>
           <p:cNvSpPr txBox="1"/>
           <p:nvPr>
             <p:ph idx="12" type="sldNum"/>
@@ -26197,7 +26249,7 @@
       </p:sp>
       <p:sp>
         <p:nvSpPr>
-          <p:cNvPr id="384" name="Google Shape;384;p58"/>
+          <p:cNvPr id="385" name="Google Shape;385;p58"/>
           <p:cNvSpPr txBox="1"/>
           <p:nvPr/>
         </p:nvSpPr>
@@ -26323,7 +26375,7 @@
       </p:sp>
       <p:pic>
         <p:nvPicPr>
-          <p:cNvPr id="385" name="Google Shape;385;p58"/>
+          <p:cNvPr id="386" name="Google Shape;386;p58"/>
           <p:cNvPicPr preferRelativeResize="0"/>
           <p:nvPr/>
         </p:nvPicPr>
@@ -26351,7 +26403,7 @@
       </p:pic>
       <p:sp>
         <p:nvSpPr>
-          <p:cNvPr id="386" name="Google Shape;386;p58"/>
+          <p:cNvPr id="387" name="Google Shape;387;p58"/>
           <p:cNvSpPr/>
           <p:nvPr/>
         </p:nvSpPr>
@@ -26436,7 +26488,7 @@
       </p:sp>
       <p:pic>
         <p:nvPicPr>
-          <p:cNvPr id="387" name="Google Shape;387;p58"/>
+          <p:cNvPr id="388" name="Google Shape;388;p58"/>
           <p:cNvPicPr preferRelativeResize="0"/>
           <p:nvPr/>
         </p:nvPicPr>
@@ -26475,7 +26527,7 @@
   <p:cSld>
     <p:spTree>
       <p:nvGrpSpPr>
-        <p:cNvPr id="391" name="Shape 391"/>
+        <p:cNvPr id="392" name="Shape 392"/>
         <p:cNvGrpSpPr/>
         <p:nvPr/>
       </p:nvGrpSpPr>
@@ -26489,7 +26541,7 @@
       </p:grpSpPr>
       <p:pic>
         <p:nvPicPr>
-          <p:cNvPr id="392" name="Google Shape;392;p59"/>
+          <p:cNvPr id="393" name="Google Shape;393;p59"/>
           <p:cNvPicPr preferRelativeResize="0"/>
           <p:nvPr/>
         </p:nvPicPr>
@@ -26517,7 +26569,7 @@
       </p:pic>
       <p:sp>
         <p:nvSpPr>
-          <p:cNvPr id="393" name="Google Shape;393;p59"/>
+          <p:cNvPr id="394" name="Google Shape;394;p59"/>
           <p:cNvSpPr txBox="1"/>
           <p:nvPr>
             <p:ph type="title"/>
@@ -26565,7 +26617,7 @@
       </p:sp>
       <p:sp>
         <p:nvSpPr>
-          <p:cNvPr id="394" name="Google Shape;394;p59"/>
+          <p:cNvPr id="395" name="Google Shape;395;p59"/>
           <p:cNvSpPr txBox="1"/>
           <p:nvPr>
             <p:ph idx="12" type="sldNum"/>
@@ -26613,7 +26665,7 @@
       </p:sp>
       <p:sp>
         <p:nvSpPr>
-          <p:cNvPr id="395" name="Google Shape;395;p59"/>
+          <p:cNvPr id="396" name="Google Shape;396;p59"/>
           <p:cNvSpPr txBox="1"/>
           <p:nvPr/>
         </p:nvSpPr>
@@ -26691,7 +26743,7 @@
       </p:sp>
       <p:pic>
         <p:nvPicPr>
-          <p:cNvPr id="396" name="Google Shape;396;p59"/>
+          <p:cNvPr id="397" name="Google Shape;397;p59"/>
           <p:cNvPicPr preferRelativeResize="0"/>
           <p:nvPr/>
         </p:nvPicPr>
@@ -26719,7 +26771,7 @@
       </p:pic>
       <p:sp>
         <p:nvSpPr>
-          <p:cNvPr id="397" name="Google Shape;397;p59"/>
+          <p:cNvPr id="398" name="Google Shape;398;p59"/>
           <p:cNvSpPr txBox="1"/>
           <p:nvPr/>
         </p:nvSpPr>
@@ -26782,7 +26834,7 @@
   <p:cSld>
     <p:spTree>
       <p:nvGrpSpPr>
-        <p:cNvPr id="401" name="Shape 401"/>
+        <p:cNvPr id="402" name="Shape 402"/>
         <p:cNvGrpSpPr/>
         <p:nvPr/>
       </p:nvGrpSpPr>
@@ -26796,7 +26848,7 @@
       </p:grpSpPr>
       <p:pic>
         <p:nvPicPr>
-          <p:cNvPr id="402" name="Google Shape;402;p60"/>
+          <p:cNvPr id="403" name="Google Shape;403;p60"/>
           <p:cNvPicPr preferRelativeResize="0"/>
           <p:nvPr/>
         </p:nvPicPr>
@@ -26824,7 +26876,7 @@
       </p:pic>
       <p:sp>
         <p:nvSpPr>
-          <p:cNvPr id="403" name="Google Shape;403;p60"/>
+          <p:cNvPr id="404" name="Google Shape;404;p60"/>
           <p:cNvSpPr txBox="1"/>
           <p:nvPr>
             <p:ph type="title"/>
@@ -26872,7 +26924,7 @@
       </p:sp>
       <p:sp>
         <p:nvSpPr>
-          <p:cNvPr id="404" name="Google Shape;404;p60"/>
+          <p:cNvPr id="405" name="Google Shape;405;p60"/>
           <p:cNvSpPr txBox="1"/>
           <p:nvPr>
             <p:ph idx="12" type="sldNum"/>
@@ -26928,7 +26980,7 @@
       </p:sp>
       <p:sp>
         <p:nvSpPr>
-          <p:cNvPr id="405" name="Google Shape;405;p60"/>
+          <p:cNvPr id="406" name="Google Shape;406;p60"/>
           <p:cNvSpPr txBox="1"/>
           <p:nvPr/>
         </p:nvSpPr>
@@ -26991,7 +27043,7 @@
       </p:sp>
       <p:sp>
         <p:nvSpPr>
-          <p:cNvPr id="406" name="Google Shape;406;p60"/>
+          <p:cNvPr id="407" name="Google Shape;407;p60"/>
           <p:cNvSpPr txBox="1"/>
           <p:nvPr/>
         </p:nvSpPr>
@@ -27032,7 +27084,7 @@
       </p:sp>
       <p:sp>
         <p:nvSpPr>
-          <p:cNvPr id="407" name="Google Shape;407;p60"/>
+          <p:cNvPr id="408" name="Google Shape;408;p60"/>
           <p:cNvSpPr txBox="1"/>
           <p:nvPr/>
         </p:nvSpPr>
@@ -27126,7 +27178,7 @@
       </p:sp>
       <p:sp>
         <p:nvSpPr>
-          <p:cNvPr id="408" name="Google Shape;408;p60"/>
+          <p:cNvPr id="409" name="Google Shape;409;p60"/>
           <p:cNvSpPr txBox="1"/>
           <p:nvPr/>
         </p:nvSpPr>
@@ -27180,7 +27232,7 @@
       </p:sp>
       <p:sp>
         <p:nvSpPr>
-          <p:cNvPr id="409" name="Google Shape;409;p60"/>
+          <p:cNvPr id="410" name="Google Shape;410;p60"/>
           <p:cNvSpPr txBox="1"/>
           <p:nvPr/>
         </p:nvSpPr>
@@ -27274,7 +27326,7 @@
       </p:sp>
       <p:sp>
         <p:nvSpPr>
-          <p:cNvPr id="410" name="Google Shape;410;p60"/>
+          <p:cNvPr id="411" name="Google Shape;411;p60"/>
           <p:cNvSpPr txBox="1"/>
           <p:nvPr/>
         </p:nvSpPr>
@@ -27346,7 +27398,7 @@
       </p:sp>
       <p:sp>
         <p:nvSpPr>
-          <p:cNvPr id="411" name="Google Shape;411;p60"/>
+          <p:cNvPr id="412" name="Google Shape;412;p60"/>
           <p:cNvSpPr txBox="1"/>
           <p:nvPr/>
         </p:nvSpPr>
@@ -27440,7 +27492,7 @@
       </p:sp>
       <p:sp>
         <p:nvSpPr>
-          <p:cNvPr id="412" name="Google Shape;412;p60"/>
+          <p:cNvPr id="413" name="Google Shape;413;p60"/>
           <p:cNvSpPr txBox="1"/>
           <p:nvPr/>
         </p:nvSpPr>
@@ -27482,7 +27534,7 @@
       </p:sp>
       <p:sp>
         <p:nvSpPr>
-          <p:cNvPr id="413" name="Google Shape;413;p60"/>
+          <p:cNvPr id="414" name="Google Shape;414;p60"/>
           <p:cNvSpPr txBox="1"/>
           <p:nvPr/>
         </p:nvSpPr>
@@ -27524,7 +27576,7 @@
       </p:sp>
       <p:sp>
         <p:nvSpPr>
-          <p:cNvPr id="414" name="Google Shape;414;p60"/>
+          <p:cNvPr id="415" name="Google Shape;415;p60"/>
           <p:cNvSpPr txBox="1"/>
           <p:nvPr/>
         </p:nvSpPr>
@@ -27566,7 +27618,7 @@
       </p:sp>
       <p:sp>
         <p:nvSpPr>
-          <p:cNvPr id="415" name="Google Shape;415;p60"/>
+          <p:cNvPr id="416" name="Google Shape;416;p60"/>
           <p:cNvSpPr txBox="1"/>
           <p:nvPr/>
         </p:nvSpPr>
@@ -27617,7 +27669,7 @@
       </p:sp>
       <p:pic>
         <p:nvPicPr>
-          <p:cNvPr id="416" name="Google Shape;416;p60"/>
+          <p:cNvPr id="417" name="Google Shape;417;p60"/>
           <p:cNvPicPr preferRelativeResize="0"/>
           <p:nvPr/>
         </p:nvPicPr>
@@ -27656,59 +27708,6 @@
             <p:seq concurrent="1" nextAc="seek">
               <p:cTn dur="indefinite" id="2" nodeType="mainSeq">
                 <p:childTnLst>
-                  <p:par>
-                    <p:cTn fill="hold">
-                      <p:stCondLst>
-                        <p:cond delay="indefinite"/>
-                      </p:stCondLst>
-                      <p:childTnLst>
-                        <p:par>
-                          <p:cTn fill="hold">
-                            <p:stCondLst>
-                              <p:cond delay="0"/>
-                            </p:stCondLst>
-                            <p:childTnLst>
-                              <p:par>
-                                <p:cTn fill="hold" nodeType="clickEffect" presetClass="entr" presetID="10" presetSubtype="0">
-                                  <p:stCondLst>
-                                    <p:cond delay="0"/>
-                                  </p:stCondLst>
-                                  <p:childTnLst>
-                                    <p:set>
-                                      <p:cBhvr>
-                                        <p:cTn dur="1" fill="hold">
-                                          <p:stCondLst>
-                                            <p:cond delay="0"/>
-                                          </p:stCondLst>
-                                        </p:cTn>
-                                        <p:tgtEl>
-                                          <p:spTgt spid="412"/>
-                                        </p:tgtEl>
-                                        <p:attrNameLst>
-                                          <p:attrName>style.visibility</p:attrName>
-                                        </p:attrNameLst>
-                                      </p:cBhvr>
-                                      <p:to>
-                                        <p:strVal val="visible"/>
-                                      </p:to>
-                                    </p:set>
-                                    <p:animEffect filter="fade" transition="in">
-                                      <p:cBhvr>
-                                        <p:cTn dur="1000"/>
-                                        <p:tgtEl>
-                                          <p:spTgt spid="412"/>
-                                        </p:tgtEl>
-                                      </p:cBhvr>
-                                    </p:animEffect>
-                                  </p:childTnLst>
-                                </p:cTn>
-                              </p:par>
-                            </p:childTnLst>
-                          </p:cTn>
-                        </p:par>
-                      </p:childTnLst>
-                    </p:cTn>
-                  </p:par>
                   <p:par>
                     <p:cTn fill="hold">
                       <p:stCondLst>
@@ -27815,6 +27814,59 @@
                       </p:childTnLst>
                     </p:cTn>
                   </p:par>
+                  <p:par>
+                    <p:cTn fill="hold">
+                      <p:stCondLst>
+                        <p:cond delay="indefinite"/>
+                      </p:stCondLst>
+                      <p:childTnLst>
+                        <p:par>
+                          <p:cTn fill="hold">
+                            <p:stCondLst>
+                              <p:cond delay="0"/>
+                            </p:stCondLst>
+                            <p:childTnLst>
+                              <p:par>
+                                <p:cTn fill="hold" nodeType="clickEffect" presetClass="entr" presetID="10" presetSubtype="0">
+                                  <p:stCondLst>
+                                    <p:cond delay="0"/>
+                                  </p:stCondLst>
+                                  <p:childTnLst>
+                                    <p:set>
+                                      <p:cBhvr>
+                                        <p:cTn dur="1" fill="hold">
+                                          <p:stCondLst>
+                                            <p:cond delay="0"/>
+                                          </p:stCondLst>
+                                        </p:cTn>
+                                        <p:tgtEl>
+                                          <p:spTgt spid="415"/>
+                                        </p:tgtEl>
+                                        <p:attrNameLst>
+                                          <p:attrName>style.visibility</p:attrName>
+                                        </p:attrNameLst>
+                                      </p:cBhvr>
+                                      <p:to>
+                                        <p:strVal val="visible"/>
+                                      </p:to>
+                                    </p:set>
+                                    <p:animEffect filter="fade" transition="in">
+                                      <p:cBhvr>
+                                        <p:cTn dur="1000"/>
+                                        <p:tgtEl>
+                                          <p:spTgt spid="415"/>
+                                        </p:tgtEl>
+                                      </p:cBhvr>
+                                    </p:animEffect>
+                                  </p:childTnLst>
+                                </p:cTn>
+                              </p:par>
+                            </p:childTnLst>
+                          </p:cTn>
+                        </p:par>
+                      </p:childTnLst>
+                    </p:cTn>
+                  </p:par>
                 </p:childTnLst>
               </p:cTn>
               <p:prevCondLst>
@@ -27845,7 +27897,7 @@
   <p:cSld>
     <p:spTree>
       <p:nvGrpSpPr>
-        <p:cNvPr id="420" name="Shape 420"/>
+        <p:cNvPr id="421" name="Shape 421"/>
         <p:cNvGrpSpPr/>
         <p:nvPr/>
       </p:nvGrpSpPr>
@@ -27859,7 +27911,7 @@
       </p:grpSpPr>
       <p:pic>
         <p:nvPicPr>
-          <p:cNvPr id="421" name="Google Shape;421;p61"/>
+          <p:cNvPr id="422" name="Google Shape;422;p61"/>
           <p:cNvPicPr preferRelativeResize="0"/>
           <p:nvPr/>
         </p:nvPicPr>
@@ -27887,7 +27939,7 @@
       </p:pic>
       <p:sp>
         <p:nvSpPr>
-          <p:cNvPr id="422" name="Google Shape;422;p61"/>
+          <p:cNvPr id="423" name="Google Shape;423;p61"/>
           <p:cNvSpPr txBox="1"/>
           <p:nvPr>
             <p:ph type="title"/>
@@ -27935,7 +27987,7 @@
       </p:sp>
       <p:sp>
         <p:nvSpPr>
-          <p:cNvPr id="423" name="Google Shape;423;p61"/>
+          <p:cNvPr id="424" name="Google Shape;424;p61"/>
           <p:cNvSpPr txBox="1"/>
           <p:nvPr/>
         </p:nvSpPr>
@@ -28056,7 +28108,7 @@
       </p:sp>
       <p:sp>
         <p:nvSpPr>
-          <p:cNvPr id="424" name="Google Shape;424;p61"/>
+          <p:cNvPr id="425" name="Google Shape;425;p61"/>
           <p:cNvSpPr txBox="1"/>
           <p:nvPr>
             <p:ph idx="12" type="sldNum"/>
@@ -28104,7 +28156,7 @@
       </p:sp>
       <p:pic>
         <p:nvPicPr>
-          <p:cNvPr id="425" name="Google Shape;425;p61"/>
+          <p:cNvPr id="426" name="Google Shape;426;p61"/>
           <p:cNvPicPr preferRelativeResize="0"/>
           <p:nvPr/>
         </p:nvPicPr>
@@ -28143,7 +28195,7 @@
   <p:cSld>
     <p:spTree>
       <p:nvGrpSpPr>
-        <p:cNvPr id="429" name="Shape 429"/>
+        <p:cNvPr id="430" name="Shape 430"/>
         <p:cNvGrpSpPr/>
         <p:nvPr/>
       </p:nvGrpSpPr>
@@ -28157,7 +28209,7 @@
       </p:grpSpPr>
       <p:pic>
         <p:nvPicPr>
-          <p:cNvPr id="430" name="Google Shape;430;p62"/>
+          <p:cNvPr id="431" name="Google Shape;431;p62"/>
           <p:cNvPicPr preferRelativeResize="0"/>
           <p:nvPr/>
         </p:nvPicPr>
@@ -28185,7 +28237,7 @@
       </p:pic>
       <p:sp>
         <p:nvSpPr>
-          <p:cNvPr id="431" name="Google Shape;431;p62"/>
+          <p:cNvPr id="432" name="Google Shape;432;p62"/>
           <p:cNvSpPr txBox="1"/>
           <p:nvPr>
             <p:ph type="title"/>
@@ -28233,7 +28285,7 @@
       </p:sp>
       <p:sp>
         <p:nvSpPr>
-          <p:cNvPr id="432" name="Google Shape;432;p62"/>
+          <p:cNvPr id="433" name="Google Shape;433;p62"/>
           <p:cNvSpPr txBox="1"/>
           <p:nvPr>
             <p:ph idx="12" type="sldNum"/>
@@ -28281,7 +28333,7 @@
       </p:sp>
       <p:sp>
         <p:nvSpPr>
-          <p:cNvPr id="433" name="Google Shape;433;p62"/>
+          <p:cNvPr id="434" name="Google Shape;434;p62"/>
           <p:cNvSpPr txBox="1"/>
           <p:nvPr/>
         </p:nvSpPr>
@@ -28437,7 +28489,7 @@
       </p:sp>
       <p:pic>
         <p:nvPicPr>
-          <p:cNvPr id="434" name="Google Shape;434;p62"/>
+          <p:cNvPr id="435" name="Google Shape;435;p62"/>
           <p:cNvPicPr preferRelativeResize="0"/>
           <p:nvPr/>
         </p:nvPicPr>
@@ -30860,9 +30912,9 @@
 </file>
 
 <file path=ppt/theme/theme1.xml><?xml version="1.0" encoding="utf-8"?>
-<a:theme xmlns:a="http://schemas.openxmlformats.org/drawingml/2006/main" xmlns:r="http://schemas.openxmlformats.org/officeDocument/2006/relationships" name="Simple Light">
+<a:theme xmlns:a="http://schemas.openxmlformats.org/drawingml/2006/main" xmlns:r="http://schemas.openxmlformats.org/officeDocument/2006/relationships">
   <a:themeElements>
-    <a:clrScheme name="Simple Light">
+    <a:clrScheme name="Default">
       <a:dk1>
         <a:srgbClr val="000000"/>
       </a:dk1>
@@ -30870,34 +30922,34 @@
         <a:srgbClr val="FFFFFF"/>
       </a:lt1>
       <a:dk2>
-        <a:srgbClr val="595959"/>
+        <a:srgbClr val="158158"/>
       </a:dk2>
       <a:lt2>
-        <a:srgbClr val="EEEEEE"/>
+        <a:srgbClr val="F3F3F3"/>
       </a:lt2>
       <a:accent1>
-        <a:srgbClr val="4285F4"/>
+        <a:srgbClr val="058DC7"/>
       </a:accent1>
       <a:accent2>
-        <a:srgbClr val="212121"/>
+        <a:srgbClr val="50B432"/>
       </a:accent2>
       <a:accent3>
-        <a:srgbClr val="78909C"/>
+        <a:srgbClr val="ED561B"/>
       </a:accent3>
       <a:accent4>
-        <a:srgbClr val="FFAB40"/>
+        <a:srgbClr val="EDEF00"/>
       </a:accent4>
       <a:accent5>
-        <a:srgbClr val="0097A7"/>
+        <a:srgbClr val="24CBE5"/>
       </a:accent5>
       <a:accent6>
-        <a:srgbClr val="EEFF41"/>
+        <a:srgbClr val="64E572"/>
       </a:accent6>
       <a:hlink>
-        <a:srgbClr val="0097A7"/>
+        <a:srgbClr val="2200CC"/>
       </a:hlink>
       <a:folHlink>
-        <a:srgbClr val="0097A7"/>
+        <a:srgbClr val="551A8B"/>
       </a:folHlink>
     </a:clrScheme>
     <a:fontScheme name="Office">
@@ -31418,285 +31470,6 @@
 </file>
 
 <file path=ppt/theme/theme3.xml><?xml version="1.0" encoding="utf-8"?>
-<a:theme xmlns:a="http://schemas.openxmlformats.org/drawingml/2006/main" xmlns:r="http://schemas.openxmlformats.org/officeDocument/2006/relationships">
-  <a:themeElements>
-    <a:clrScheme name="Default">
-      <a:dk1>
-        <a:srgbClr val="000000"/>
-      </a:dk1>
-      <a:lt1>
-        <a:srgbClr val="FFFFFF"/>
-      </a:lt1>
-      <a:dk2>
-        <a:srgbClr val="158158"/>
-      </a:dk2>
-      <a:lt2>
-        <a:srgbClr val="F3F3F3"/>
-      </a:lt2>
-      <a:accent1>
-        <a:srgbClr val="058DC7"/>
-      </a:accent1>
-      <a:accent2>
-        <a:srgbClr val="50B432"/>
-      </a:accent2>
-      <a:accent3>
-        <a:srgbClr val="ED561B"/>
-      </a:accent3>
-      <a:accent4>
-        <a:srgbClr val="EDEF00"/>
-      </a:accent4>
-      <a:accent5>
-        <a:srgbClr val="24CBE5"/>
-      </a:accent5>
-      <a:accent6>
-        <a:srgbClr val="64E572"/>
-      </a:accent6>
-      <a:hlink>
-        <a:srgbClr val="2200CC"/>
-      </a:hlink>
-      <a:folHlink>
-        <a:srgbClr val="551A8B"/>
-      </a:folHlink>
-    </a:clrScheme>
-    <a:fontScheme name="Office">
-      <a:majorFont>
-        <a:latin typeface="Arial"/>
-        <a:ea typeface=""/>
-        <a:cs typeface=""/>
-        <a:font script="Jpan" typeface="ＭＳ Ｐゴシック"/>
-        <a:font script="Hang" typeface="맑은 고딕"/>
-        <a:font script="Hans" typeface="宋体"/>
-        <a:font script="Hant" typeface="新細明體"/>
-        <a:font script="Arab" typeface="Times New Roman"/>
-        <a:font script="Hebr" typeface="Times New Roman"/>
-        <a:font script="Thai" typeface="Angsana New"/>
-        <a:font script="Ethi" typeface="Nyala"/>
-        <a:font script="Beng" typeface="Vrinda"/>
-        <a:font script="Gujr" typeface="Shruti"/>
-        <a:font script="Khmr" typeface="MoolBoran"/>
-        <a:font script="Knda" typeface="Tunga"/>
-        <a:font script="Guru" typeface="Raavi"/>
-        <a:font script="Cans" typeface="Euphemia"/>
-        <a:font script="Cher" typeface="Plantagenet Cherokee"/>
-        <a:font script="Yiii" typeface="Microsoft Yi Baiti"/>
-        <a:font script="Tibt" typeface="Microsoft Himalaya"/>
-        <a:font script="Thaa" typeface="MV Boli"/>
-        <a:font script="Deva" typeface="Mangal"/>
-        <a:font script="Telu" typeface="Gautami"/>
-        <a:font script="Taml" typeface="Latha"/>
-        <a:font script="Syrc" typeface="Estrangelo Edessa"/>
-        <a:font script="Orya" typeface="Kalinga"/>
-        <a:font script="Mlym" typeface="Kartika"/>
-        <a:font script="Laoo" typeface="DokChampa"/>
-        <a:font script="Sinh" typeface="Iskoola Pota"/>
-        <a:font script="Mong" typeface="Mongolian Baiti"/>
-        <a:font script="Viet" typeface="Times New Roman"/>
-        <a:font script="Uigh" typeface="Microsoft Uighur"/>
-        <a:font script="Geor" typeface="Sylfaen"/>
-      </a:majorFont>
-      <a:minorFont>
-        <a:latin typeface="Arial"/>
-        <a:ea typeface=""/>
-        <a:cs typeface=""/>
-        <a:font script="Jpan" typeface="ＭＳ Ｐゴシック"/>
-        <a:font script="Hang" typeface="맑은 고딕"/>
-        <a:font script="Hans" typeface="宋体"/>
-        <a:font script="Hant" typeface="新細明體"/>
-        <a:font script="Arab" typeface="Arial"/>
-        <a:font script="Hebr" typeface="Arial"/>
-        <a:font script="Thai" typeface="Cordia New"/>
-        <a:font script="Ethi" typeface="Nyala"/>
-        <a:font script="Beng" typeface="Vrinda"/>
-        <a:font script="Gujr" typeface="Shruti"/>
-        <a:font script="Khmr" typeface="DaunPenh"/>
-        <a:font script="Knda" typeface="Tunga"/>
-        <a:font script="Guru" typeface="Raavi"/>
-        <a:font script="Cans" typeface="Euphemia"/>
-        <a:font script="Cher" typeface="Plantagenet Cherokee"/>
-        <a:font script="Yiii" typeface="Microsoft Yi Baiti"/>
-        <a:font script="Tibt" typeface="Microsoft Himalaya"/>
-        <a:font script="Thaa" typeface="MV Boli"/>
-        <a:font script="Deva" typeface="Mangal"/>
-        <a:font script="Telu" typeface="Gautami"/>
-        <a:font script="Taml" typeface="Latha"/>
-        <a:font script="Syrc" typeface="Estrangelo Edessa"/>
-        <a:font script="Orya" typeface="Kalinga"/>
-        <a:font script="Mlym" typeface="Kartika"/>
-        <a:font script="Laoo" typeface="DokChampa"/>
-        <a:font script="Sinh" typeface="Iskoola Pota"/>
-        <a:font script="Mong" typeface="Mongolian Baiti"/>
-        <a:font script="Viet" typeface="Arial"/>
-        <a:font script="Uigh" typeface="Microsoft Uighur"/>
-        <a:font script="Geor" typeface="Sylfaen"/>
-      </a:minorFont>
-    </a:fontScheme>
-    <a:fmtScheme name="Office">
-      <a:fillStyleLst>
-        <a:solidFill>
-          <a:schemeClr val="phClr"/>
-        </a:solidFill>
-        <a:gradFill rotWithShape="1">
-          <a:gsLst>
-            <a:gs pos="0">
-              <a:schemeClr val="phClr">
-                <a:tint val="50000"/>
-                <a:satMod val="300000"/>
-              </a:schemeClr>
-            </a:gs>
-            <a:gs pos="35000">
-              <a:schemeClr val="phClr">
-                <a:tint val="37000"/>
-                <a:satMod val="300000"/>
-              </a:schemeClr>
-            </a:gs>
-            <a:gs pos="100000">
-              <a:schemeClr val="phClr">
-                <a:tint val="15000"/>
-                <a:satMod val="350000"/>
-              </a:schemeClr>
-            </a:gs>
-          </a:gsLst>
-          <a:lin ang="16200000" scaled="1"/>
-        </a:gradFill>
-        <a:gradFill rotWithShape="1">
-          <a:gsLst>
-            <a:gs pos="0">
-              <a:schemeClr val="phClr">
-                <a:tint val="100000"/>
-                <a:shade val="100000"/>
-                <a:satMod val="130000"/>
-              </a:schemeClr>
-            </a:gs>
-            <a:gs pos="100000">
-              <a:schemeClr val="phClr">
-                <a:tint val="50000"/>
-                <a:shade val="100000"/>
-                <a:satMod val="350000"/>
-              </a:schemeClr>
-            </a:gs>
-          </a:gsLst>
-          <a:lin ang="16200000" scaled="0"/>
-        </a:gradFill>
-      </a:fillStyleLst>
-      <a:lnStyleLst>
-        <a:ln w="9525" cap="flat" cmpd="sng" algn="ctr">
-          <a:solidFill>
-            <a:schemeClr val="phClr">
-              <a:shade val="95000"/>
-              <a:satMod val="105000"/>
-            </a:schemeClr>
-          </a:solidFill>
-          <a:prstDash val="solid"/>
-        </a:ln>
-        <a:ln w="25400" cap="flat" cmpd="sng" algn="ctr">
-          <a:solidFill>
-            <a:schemeClr val="phClr"/>
-          </a:solidFill>
-          <a:prstDash val="solid"/>
-        </a:ln>
-        <a:ln w="38100" cap="flat" cmpd="sng" algn="ctr">
-          <a:solidFill>
-            <a:schemeClr val="phClr"/>
-          </a:solidFill>
-          <a:prstDash val="solid"/>
-        </a:ln>
-      </a:lnStyleLst>
-      <a:effectStyleLst>
-        <a:effectStyle>
-          <a:effectLst>
-            <a:outerShdw blurRad="40000" dist="20000" dir="5400000" rotWithShape="0">
-              <a:srgbClr val="000000">
-                <a:alpha val="38000"/>
-              </a:srgbClr>
-            </a:outerShdw>
-          </a:effectLst>
-        </a:effectStyle>
-        <a:effectStyle>
-          <a:effectLst>
-            <a:outerShdw blurRad="40000" dist="23000" dir="5400000" rotWithShape="0">
-              <a:srgbClr val="000000">
-                <a:alpha val="35000"/>
-              </a:srgbClr>
-            </a:outerShdw>
-          </a:effectLst>
-        </a:effectStyle>
-        <a:effectStyle>
-          <a:effectLst>
-            <a:outerShdw blurRad="40000" dist="23000" dir="5400000" rotWithShape="0">
-              <a:srgbClr val="000000">
-                <a:alpha val="35000"/>
-              </a:srgbClr>
-            </a:outerShdw>
-          </a:effectLst>
-          <a:scene3d>
-            <a:camera prst="orthographicFront">
-              <a:rot lat="0" lon="0" rev="0"/>
-            </a:camera>
-            <a:lightRig rig="threePt" dir="t">
-              <a:rot lat="0" lon="0" rev="1200000"/>
-            </a:lightRig>
-          </a:scene3d>
-          <a:sp3d>
-            <a:bevelT w="63500" h="25400"/>
-          </a:sp3d>
-        </a:effectStyle>
-      </a:effectStyleLst>
-      <a:bgFillStyleLst>
-        <a:solidFill>
-          <a:schemeClr val="phClr"/>
-        </a:solidFill>
-        <a:gradFill rotWithShape="1">
-          <a:gsLst>
-            <a:gs pos="0">
-              <a:schemeClr val="phClr">
-                <a:tint val="40000"/>
-                <a:satMod val="350000"/>
-              </a:schemeClr>
-            </a:gs>
-            <a:gs pos="40000">
-              <a:schemeClr val="phClr">
-                <a:tint val="45000"/>
-                <a:shade val="99000"/>
-                <a:satMod val="350000"/>
-              </a:schemeClr>
-            </a:gs>
-            <a:gs pos="100000">
-              <a:schemeClr val="phClr">
-                <a:shade val="20000"/>
-                <a:satMod val="255000"/>
-              </a:schemeClr>
-            </a:gs>
-          </a:gsLst>
-          <a:path path="circle">
-            <a:fillToRect l="50000" t="-80000" r="50000" b="180000"/>
-          </a:path>
-        </a:gradFill>
-        <a:gradFill rotWithShape="1">
-          <a:gsLst>
-            <a:gs pos="0">
-              <a:schemeClr val="phClr">
-                <a:tint val="80000"/>
-                <a:satMod val="300000"/>
-              </a:schemeClr>
-            </a:gs>
-            <a:gs pos="100000">
-              <a:schemeClr val="phClr">
-                <a:shade val="30000"/>
-                <a:satMod val="200000"/>
-              </a:schemeClr>
-            </a:gs>
-          </a:gsLst>
-          <a:path path="circle">
-            <a:fillToRect l="50000" t="50000" r="50000" b="50000"/>
-          </a:path>
-        </a:gradFill>
-      </a:bgFillStyleLst>
-    </a:fmtScheme>
-  </a:themeElements>
-</a:theme>
-</file>
-
-<file path=ppt/theme/theme4.xml><?xml version="1.0" encoding="utf-8"?>
 <a:theme xmlns:a="http://schemas.openxmlformats.org/drawingml/2006/main" xmlns:r="http://schemas.openxmlformats.org/officeDocument/2006/relationships" name="Geometric">
   <a:themeElements>
     <a:clrScheme name="Geometric">
@@ -31973,4 +31746,283 @@
     </a:fmtScheme>
   </a:themeElements>
 </a:theme>
+</file>
+
+<file path=ppt/theme/theme4.xml><?xml version="1.0" encoding="utf-8"?>
+<a:theme xmlns:a="http://schemas.openxmlformats.org/drawingml/2006/main" xmlns:r="http://schemas.openxmlformats.org/officeDocument/2006/relationships" name="Simple Light">
+  <a:themeElements>
+    <a:clrScheme name="Simple Light">
+      <a:dk1>
+        <a:srgbClr val="000000"/>
+      </a:dk1>
+      <a:lt1>
+        <a:srgbClr val="FFFFFF"/>
+      </a:lt1>
+      <a:dk2>
+        <a:srgbClr val="595959"/>
+      </a:dk2>
+      <a:lt2>
+        <a:srgbClr val="EEEEEE"/>
+      </a:lt2>
+      <a:accent1>
+        <a:srgbClr val="4285F4"/>
+      </a:accent1>
+      <a:accent2>
+        <a:srgbClr val="212121"/>
+      </a:accent2>
+      <a:accent3>
+        <a:srgbClr val="78909C"/>
+      </a:accent3>
+      <a:accent4>
+        <a:srgbClr val="FFAB40"/>
+      </a:accent4>
+      <a:accent5>
+        <a:srgbClr val="0097A7"/>
+      </a:accent5>
+      <a:accent6>
+        <a:srgbClr val="EEFF41"/>
+      </a:accent6>
+      <a:hlink>
+        <a:srgbClr val="0097A7"/>
+      </a:hlink>
+      <a:folHlink>
+        <a:srgbClr val="0097A7"/>
+      </a:folHlink>
+    </a:clrScheme>
+    <a:fontScheme name="Office">
+      <a:majorFont>
+        <a:latin typeface="Arial"/>
+        <a:ea typeface=""/>
+        <a:cs typeface=""/>
+        <a:font script="Jpan" typeface="ＭＳ Ｐゴシック"/>
+        <a:font script="Hang" typeface="맑은 고딕"/>
+        <a:font script="Hans" typeface="宋体"/>
+        <a:font script="Hant" typeface="新細明體"/>
+        <a:font script="Arab" typeface="Times New Roman"/>
+        <a:font script="Hebr" typeface="Times New Roman"/>
+        <a:font script="Thai" typeface="Angsana New"/>
+        <a:font script="Ethi" typeface="Nyala"/>
+        <a:font script="Beng" typeface="Vrinda"/>
+        <a:font script="Gujr" typeface="Shruti"/>
+        <a:font script="Khmr" typeface="MoolBoran"/>
+        <a:font script="Knda" typeface="Tunga"/>
+        <a:font script="Guru" typeface="Raavi"/>
+        <a:font script="Cans" typeface="Euphemia"/>
+        <a:font script="Cher" typeface="Plantagenet Cherokee"/>
+        <a:font script="Yiii" typeface="Microsoft Yi Baiti"/>
+        <a:font script="Tibt" typeface="Microsoft Himalaya"/>
+        <a:font script="Thaa" typeface="MV Boli"/>
+        <a:font script="Deva" typeface="Mangal"/>
+        <a:font script="Telu" typeface="Gautami"/>
+        <a:font script="Taml" typeface="Latha"/>
+        <a:font script="Syrc" typeface="Estrangelo Edessa"/>
+        <a:font script="Orya" typeface="Kalinga"/>
+        <a:font script="Mlym" typeface="Kartika"/>
+        <a:font script="Laoo" typeface="DokChampa"/>
+        <a:font script="Sinh" typeface="Iskoola Pota"/>
+        <a:font script="Mong" typeface="Mongolian Baiti"/>
+        <a:font script="Viet" typeface="Times New Roman"/>
+        <a:font script="Uigh" typeface="Microsoft Uighur"/>
+        <a:font script="Geor" typeface="Sylfaen"/>
+      </a:majorFont>
+      <a:minorFont>
+        <a:latin typeface="Arial"/>
+        <a:ea typeface=""/>
+        <a:cs typeface=""/>
+        <a:font script="Jpan" typeface="ＭＳ Ｐゴシック"/>
+        <a:font script="Hang" typeface="맑은 고딕"/>
+        <a:font script="Hans" typeface="宋体"/>
+        <a:font script="Hant" typeface="新細明體"/>
+        <a:font script="Arab" typeface="Arial"/>
+        <a:font script="Hebr" typeface="Arial"/>
+        <a:font script="Thai" typeface="Cordia New"/>
+        <a:font script="Ethi" typeface="Nyala"/>
+        <a:font script="Beng" typeface="Vrinda"/>
+        <a:font script="Gujr" typeface="Shruti"/>
+        <a:font script="Khmr" typeface="DaunPenh"/>
+        <a:font script="Knda" typeface="Tunga"/>
+        <a:font script="Guru" typeface="Raavi"/>
+        <a:font script="Cans" typeface="Euphemia"/>
+        <a:font script="Cher" typeface="Plantagenet Cherokee"/>
+        <a:font script="Yiii" typeface="Microsoft Yi Baiti"/>
+        <a:font script="Tibt" typeface="Microsoft Himalaya"/>
+        <a:font script="Thaa" typeface="MV Boli"/>
+        <a:font script="Deva" typeface="Mangal"/>
+        <a:font script="Telu" typeface="Gautami"/>
+        <a:font script="Taml" typeface="Latha"/>
+        <a:font script="Syrc" typeface="Estrangelo Edessa"/>
+        <a:font script="Orya" typeface="Kalinga"/>
+        <a:font script="Mlym" typeface="Kartika"/>
+        <a:font script="Laoo" typeface="DokChampa"/>
+        <a:font script="Sinh" typeface="Iskoola Pota"/>
+        <a:font script="Mong" typeface="Mongolian Baiti"/>
+        <a:font script="Viet" typeface="Arial"/>
+        <a:font script="Uigh" typeface="Microsoft Uighur"/>
+        <a:font script="Geor" typeface="Sylfaen"/>
+      </a:minorFont>
+    </a:fontScheme>
+    <a:fmtScheme name="Office">
+      <a:fillStyleLst>
+        <a:solidFill>
+          <a:schemeClr val="phClr"/>
+        </a:solidFill>
+        <a:gradFill rotWithShape="1">
+          <a:gsLst>
+            <a:gs pos="0">
+              <a:schemeClr val="phClr">
+                <a:tint val="50000"/>
+                <a:satMod val="300000"/>
+              </a:schemeClr>
+            </a:gs>
+            <a:gs pos="35000">
+              <a:schemeClr val="phClr">
+                <a:tint val="37000"/>
+                <a:satMod val="300000"/>
+              </a:schemeClr>
+            </a:gs>
+            <a:gs pos="100000">
+              <a:schemeClr val="phClr">
+                <a:tint val="15000"/>
+                <a:satMod val="350000"/>
+              </a:schemeClr>
+            </a:gs>
+          </a:gsLst>
+          <a:lin ang="16200000" scaled="1"/>
+        </a:gradFill>
+        <a:gradFill rotWithShape="1">
+          <a:gsLst>
+            <a:gs pos="0">
+              <a:schemeClr val="phClr">
+                <a:tint val="100000"/>
+                <a:shade val="100000"/>
+                <a:satMod val="130000"/>
+              </a:schemeClr>
+            </a:gs>
+            <a:gs pos="100000">
+              <a:schemeClr val="phClr">
+                <a:tint val="50000"/>
+                <a:shade val="100000"/>
+                <a:satMod val="350000"/>
+              </a:schemeClr>
+            </a:gs>
+          </a:gsLst>
+          <a:lin ang="16200000" scaled="0"/>
+        </a:gradFill>
+      </a:fillStyleLst>
+      <a:lnStyleLst>
+        <a:ln w="9525" cap="flat" cmpd="sng" algn="ctr">
+          <a:solidFill>
+            <a:schemeClr val="phClr">
+              <a:shade val="95000"/>
+              <a:satMod val="105000"/>
+            </a:schemeClr>
+          </a:solidFill>
+          <a:prstDash val="solid"/>
+        </a:ln>
+        <a:ln w="25400" cap="flat" cmpd="sng" algn="ctr">
+          <a:solidFill>
+            <a:schemeClr val="phClr"/>
+          </a:solidFill>
+          <a:prstDash val="solid"/>
+        </a:ln>
+        <a:ln w="38100" cap="flat" cmpd="sng" algn="ctr">
+          <a:solidFill>
+            <a:schemeClr val="phClr"/>
+          </a:solidFill>
+          <a:prstDash val="solid"/>
+        </a:ln>
+      </a:lnStyleLst>
+      <a:effectStyleLst>
+        <a:effectStyle>
+          <a:effectLst>
+            <a:outerShdw blurRad="40000" dist="20000" dir="5400000" rotWithShape="0">
+              <a:srgbClr val="000000">
+                <a:alpha val="38000"/>
+              </a:srgbClr>
+            </a:outerShdw>
+          </a:effectLst>
+        </a:effectStyle>
+        <a:effectStyle>
+          <a:effectLst>
+            <a:outerShdw blurRad="40000" dist="23000" dir="5400000" rotWithShape="0">
+              <a:srgbClr val="000000">
+                <a:alpha val="35000"/>
+              </a:srgbClr>
+            </a:outerShdw>
+          </a:effectLst>
+        </a:effectStyle>
+        <a:effectStyle>
+          <a:effectLst>
+            <a:outerShdw blurRad="40000" dist="23000" dir="5400000" rotWithShape="0">
+              <a:srgbClr val="000000">
+                <a:alpha val="35000"/>
+              </a:srgbClr>
+            </a:outerShdw>
+          </a:effectLst>
+          <a:scene3d>
+            <a:camera prst="orthographicFront">
+              <a:rot lat="0" lon="0" rev="0"/>
+            </a:camera>
+            <a:lightRig rig="threePt" dir="t">
+              <a:rot lat="0" lon="0" rev="1200000"/>
+            </a:lightRig>
+          </a:scene3d>
+          <a:sp3d>
+            <a:bevelT w="63500" h="25400"/>
+          </a:sp3d>
+        </a:effectStyle>
+      </a:effectStyleLst>
+      <a:bgFillStyleLst>
+        <a:solidFill>
+          <a:schemeClr val="phClr"/>
+        </a:solidFill>
+        <a:gradFill rotWithShape="1">
+          <a:gsLst>
+            <a:gs pos="0">
+              <a:schemeClr val="phClr">
+                <a:tint val="40000"/>
+                <a:satMod val="350000"/>
+              </a:schemeClr>
+            </a:gs>
+            <a:gs pos="40000">
+              <a:schemeClr val="phClr">
+                <a:tint val="45000"/>
+                <a:shade val="99000"/>
+                <a:satMod val="350000"/>
+              </a:schemeClr>
+            </a:gs>
+            <a:gs pos="100000">
+              <a:schemeClr val="phClr">
+                <a:shade val="20000"/>
+                <a:satMod val="255000"/>
+              </a:schemeClr>
+            </a:gs>
+          </a:gsLst>
+          <a:path path="circle">
+            <a:fillToRect l="50000" t="-80000" r="50000" b="180000"/>
+          </a:path>
+        </a:gradFill>
+        <a:gradFill rotWithShape="1">
+          <a:gsLst>
+            <a:gs pos="0">
+              <a:schemeClr val="phClr">
+                <a:tint val="80000"/>
+                <a:satMod val="300000"/>
+              </a:schemeClr>
+            </a:gs>
+            <a:gs pos="100000">
+              <a:schemeClr val="phClr">
+                <a:shade val="30000"/>
+                <a:satMod val="200000"/>
+              </a:schemeClr>
+            </a:gs>
+          </a:gsLst>
+          <a:path path="circle">
+            <a:fillToRect l="50000" t="50000" r="50000" b="50000"/>
+          </a:path>
+        </a:gradFill>
+      </a:bgFillStyleLst>
+    </a:fmtScheme>
+  </a:themeElements>
+</a:theme>
 </file>
</xml_diff>

<commit_message>
remove bash command head
</commit_message>
<xml_diff>
--- a/Day_2/Lectures/Day_2_Lecture_1_Data_Collection_Data_Preparation.pptx
+++ b/Day_2/Lectures/Day_2_Lecture_1_Data_Collection_Data_Preparation.pptx
@@ -30912,9 +30912,9 @@
 </file>
 
 <file path=ppt/theme/theme1.xml><?xml version="1.0" encoding="utf-8"?>
-<a:theme xmlns:a="http://schemas.openxmlformats.org/drawingml/2006/main" xmlns:r="http://schemas.openxmlformats.org/officeDocument/2006/relationships">
+<a:theme xmlns:a="http://schemas.openxmlformats.org/drawingml/2006/main" xmlns:r="http://schemas.openxmlformats.org/officeDocument/2006/relationships" name="Simple Light">
   <a:themeElements>
-    <a:clrScheme name="Default">
+    <a:clrScheme name="Simple Light">
       <a:dk1>
         <a:srgbClr val="000000"/>
       </a:dk1>
@@ -30922,34 +30922,34 @@
         <a:srgbClr val="FFFFFF"/>
       </a:lt1>
       <a:dk2>
-        <a:srgbClr val="158158"/>
+        <a:srgbClr val="595959"/>
       </a:dk2>
       <a:lt2>
-        <a:srgbClr val="F3F3F3"/>
+        <a:srgbClr val="EEEEEE"/>
       </a:lt2>
       <a:accent1>
-        <a:srgbClr val="058DC7"/>
+        <a:srgbClr val="4285F4"/>
       </a:accent1>
       <a:accent2>
-        <a:srgbClr val="50B432"/>
+        <a:srgbClr val="212121"/>
       </a:accent2>
       <a:accent3>
-        <a:srgbClr val="ED561B"/>
+        <a:srgbClr val="78909C"/>
       </a:accent3>
       <a:accent4>
-        <a:srgbClr val="EDEF00"/>
+        <a:srgbClr val="FFAB40"/>
       </a:accent4>
       <a:accent5>
-        <a:srgbClr val="24CBE5"/>
+        <a:srgbClr val="0097A7"/>
       </a:accent5>
       <a:accent6>
-        <a:srgbClr val="64E572"/>
+        <a:srgbClr val="EEFF41"/>
       </a:accent6>
       <a:hlink>
-        <a:srgbClr val="2200CC"/>
+        <a:srgbClr val="0097A7"/>
       </a:hlink>
       <a:folHlink>
-        <a:srgbClr val="551A8B"/>
+        <a:srgbClr val="0097A7"/>
       </a:folHlink>
     </a:clrScheme>
     <a:fontScheme name="Office">
@@ -31191,44 +31191,44 @@
 </file>
 
 <file path=ppt/theme/theme2.xml><?xml version="1.0" encoding="utf-8"?>
-<a:theme xmlns:a="http://schemas.openxmlformats.org/drawingml/2006/main" xmlns:r="http://schemas.openxmlformats.org/officeDocument/2006/relationships" name="Simple Light">
+<a:theme xmlns:a="http://schemas.openxmlformats.org/drawingml/2006/main" xmlns:r="http://schemas.openxmlformats.org/officeDocument/2006/relationships" name="Geometric">
   <a:themeElements>
-    <a:clrScheme name="Simple Light">
+    <a:clrScheme name="Geometric">
       <a:dk1>
-        <a:srgbClr val="000000"/>
+        <a:srgbClr val="2A3990"/>
       </a:dk1>
       <a:lt1>
         <a:srgbClr val="FFFFFF"/>
       </a:lt1>
       <a:dk2>
-        <a:srgbClr val="595959"/>
+        <a:srgbClr val="434343"/>
       </a:dk2>
       <a:lt2>
-        <a:srgbClr val="EEEEEE"/>
+        <a:srgbClr val="999999"/>
       </a:lt2>
       <a:accent1>
-        <a:srgbClr val="4285F4"/>
+        <a:srgbClr val="212D74"/>
       </a:accent1>
       <a:accent2>
-        <a:srgbClr val="212121"/>
+        <a:srgbClr val="3949AB"/>
       </a:accent2>
       <a:accent3>
-        <a:srgbClr val="78909C"/>
+        <a:srgbClr val="9C254D"/>
       </a:accent3>
       <a:accent4>
-        <a:srgbClr val="FFAB40"/>
+        <a:srgbClr val="D23369"/>
       </a:accent4>
       <a:accent5>
-        <a:srgbClr val="0097A7"/>
+        <a:srgbClr val="F06292"/>
       </a:accent5>
       <a:accent6>
-        <a:srgbClr val="EEFF41"/>
+        <a:srgbClr val="7890CD"/>
       </a:accent6>
       <a:hlink>
-        <a:srgbClr val="0097A7"/>
+        <a:srgbClr val="F06292"/>
       </a:hlink>
       <a:folHlink>
-        <a:srgbClr val="0097A7"/>
+        <a:srgbClr val="F06292"/>
       </a:folHlink>
     </a:clrScheme>
     <a:fontScheme name="Office">
@@ -31749,44 +31749,44 @@
 </file>
 
 <file path=ppt/theme/theme4.xml><?xml version="1.0" encoding="utf-8"?>
-<a:theme xmlns:a="http://schemas.openxmlformats.org/drawingml/2006/main" xmlns:r="http://schemas.openxmlformats.org/officeDocument/2006/relationships" name="Geometric">
+<a:theme xmlns:a="http://schemas.openxmlformats.org/drawingml/2006/main" xmlns:r="http://schemas.openxmlformats.org/officeDocument/2006/relationships">
   <a:themeElements>
-    <a:clrScheme name="Geometric">
+    <a:clrScheme name="Default">
       <a:dk1>
-        <a:srgbClr val="2A3990"/>
+        <a:srgbClr val="000000"/>
       </a:dk1>
       <a:lt1>
         <a:srgbClr val="FFFFFF"/>
       </a:lt1>
       <a:dk2>
-        <a:srgbClr val="434343"/>
+        <a:srgbClr val="158158"/>
       </a:dk2>
       <a:lt2>
-        <a:srgbClr val="999999"/>
+        <a:srgbClr val="F3F3F3"/>
       </a:lt2>
       <a:accent1>
-        <a:srgbClr val="212D74"/>
+        <a:srgbClr val="058DC7"/>
       </a:accent1>
       <a:accent2>
-        <a:srgbClr val="3949AB"/>
+        <a:srgbClr val="50B432"/>
       </a:accent2>
       <a:accent3>
-        <a:srgbClr val="9C254D"/>
+        <a:srgbClr val="ED561B"/>
       </a:accent3>
       <a:accent4>
-        <a:srgbClr val="D23369"/>
+        <a:srgbClr val="EDEF00"/>
       </a:accent4>
       <a:accent5>
-        <a:srgbClr val="F06292"/>
+        <a:srgbClr val="24CBE5"/>
       </a:accent5>
       <a:accent6>
-        <a:srgbClr val="7890CD"/>
+        <a:srgbClr val="64E572"/>
       </a:accent6>
       <a:hlink>
-        <a:srgbClr val="F06292"/>
+        <a:srgbClr val="2200CC"/>
       </a:hlink>
       <a:folHlink>
-        <a:srgbClr val="F06292"/>
+        <a:srgbClr val="551A8B"/>
       </a:folHlink>
     </a:clrScheme>
     <a:fontScheme name="Office">

</xml_diff>

<commit_message>
update day 2 contents after review
</commit_message>
<xml_diff>
--- a/Day_2/Lectures/Day_2_Lecture_1_Data_Collection_Data_Preparation.pptx
+++ b/Day_2/Lectures/Day_2_Lecture_1_Data_Collection_Data_Preparation.pptx
@@ -22443,7 +22443,7 @@
         <p:spPr>
           <a:xfrm>
             <a:off x="212175" y="740725"/>
-            <a:ext cx="8520600" cy="1212000"/>
+            <a:ext cx="8520600" cy="946500"/>
           </a:xfrm>
           <a:prstGeom prst="rect">
             <a:avLst/>
@@ -22474,7 +22474,7 @@
             </a:pPr>
             <a:r>
               <a:rPr lang="en" sz="1500"/>
-              <a:t>Data available in the form of tables in databases, or to be more specific, relational databases, comprise of another format of structured data that we encounter when working on different use cases, most of them conforming to the SQL standard.</a:t>
+              <a:t>Data available in the form of tables in databases, or to be more specific, relational databases, comprise of another format of structured data conforming to the SQL standard.</a:t>
             </a:r>
             <a:endParaRPr sz="1500"/>
           </a:p>
@@ -22534,7 +22534,7 @@
         </p:nvSpPr>
         <p:spPr>
           <a:xfrm>
-            <a:off x="212175" y="1573075"/>
+            <a:off x="212175" y="1440900"/>
             <a:ext cx="5869500" cy="2008800"/>
           </a:xfrm>
           <a:prstGeom prst="rect">
@@ -23618,8 +23618,8 @@
         </p:nvSpPr>
         <p:spPr>
           <a:xfrm>
-            <a:off x="769925" y="934200"/>
-            <a:ext cx="7682400" cy="1544100"/>
+            <a:off x="418525" y="934200"/>
+            <a:ext cx="8348400" cy="1544100"/>
           </a:xfrm>
           <a:prstGeom prst="roundRect">
             <a:avLst>
@@ -23744,7 +23744,7 @@
         </p:blipFill>
         <p:spPr>
           <a:xfrm>
-            <a:off x="923600" y="1083412"/>
+            <a:off x="548700" y="1050387"/>
             <a:ext cx="766300" cy="492125"/>
           </a:xfrm>
           <a:prstGeom prst="rect">
@@ -23764,8 +23764,8 @@
         </p:nvSpPr>
         <p:spPr>
           <a:xfrm>
-            <a:off x="690750" y="2670750"/>
-            <a:ext cx="8193300" cy="1761000"/>
+            <a:off x="418525" y="2713800"/>
+            <a:ext cx="8193300" cy="2026500"/>
           </a:xfrm>
           <a:prstGeom prst="rect">
             <a:avLst/>
@@ -28903,7 +28903,7 @@
             </a:pPr>
             <a:r>
               <a:rPr lang="en" sz="1600"/>
-              <a:t>Introduction to Google Colab, NumPy and Pandas, Gene family prediction</a:t>
+              <a:t>Introduction to Google Colab, NumPy and Pandas</a:t>
             </a:r>
             <a:endParaRPr sz="1600"/>
           </a:p>
@@ -31191,285 +31191,6 @@
 </file>
 
 <file path=ppt/theme/theme2.xml><?xml version="1.0" encoding="utf-8"?>
-<a:theme xmlns:a="http://schemas.openxmlformats.org/drawingml/2006/main" xmlns:r="http://schemas.openxmlformats.org/officeDocument/2006/relationships" name="Geometric">
-  <a:themeElements>
-    <a:clrScheme name="Geometric">
-      <a:dk1>
-        <a:srgbClr val="2A3990"/>
-      </a:dk1>
-      <a:lt1>
-        <a:srgbClr val="FFFFFF"/>
-      </a:lt1>
-      <a:dk2>
-        <a:srgbClr val="434343"/>
-      </a:dk2>
-      <a:lt2>
-        <a:srgbClr val="999999"/>
-      </a:lt2>
-      <a:accent1>
-        <a:srgbClr val="212D74"/>
-      </a:accent1>
-      <a:accent2>
-        <a:srgbClr val="3949AB"/>
-      </a:accent2>
-      <a:accent3>
-        <a:srgbClr val="9C254D"/>
-      </a:accent3>
-      <a:accent4>
-        <a:srgbClr val="D23369"/>
-      </a:accent4>
-      <a:accent5>
-        <a:srgbClr val="F06292"/>
-      </a:accent5>
-      <a:accent6>
-        <a:srgbClr val="7890CD"/>
-      </a:accent6>
-      <a:hlink>
-        <a:srgbClr val="F06292"/>
-      </a:hlink>
-      <a:folHlink>
-        <a:srgbClr val="F06292"/>
-      </a:folHlink>
-    </a:clrScheme>
-    <a:fontScheme name="Office">
-      <a:majorFont>
-        <a:latin typeface="Arial"/>
-        <a:ea typeface=""/>
-        <a:cs typeface=""/>
-        <a:font script="Jpan" typeface="ＭＳ Ｐゴシック"/>
-        <a:font script="Hang" typeface="맑은 고딕"/>
-        <a:font script="Hans" typeface="宋体"/>
-        <a:font script="Hant" typeface="新細明體"/>
-        <a:font script="Arab" typeface="Times New Roman"/>
-        <a:font script="Hebr" typeface="Times New Roman"/>
-        <a:font script="Thai" typeface="Angsana New"/>
-        <a:font script="Ethi" typeface="Nyala"/>
-        <a:font script="Beng" typeface="Vrinda"/>
-        <a:font script="Gujr" typeface="Shruti"/>
-        <a:font script="Khmr" typeface="MoolBoran"/>
-        <a:font script="Knda" typeface="Tunga"/>
-        <a:font script="Guru" typeface="Raavi"/>
-        <a:font script="Cans" typeface="Euphemia"/>
-        <a:font script="Cher" typeface="Plantagenet Cherokee"/>
-        <a:font script="Yiii" typeface="Microsoft Yi Baiti"/>
-        <a:font script="Tibt" typeface="Microsoft Himalaya"/>
-        <a:font script="Thaa" typeface="MV Boli"/>
-        <a:font script="Deva" typeface="Mangal"/>
-        <a:font script="Telu" typeface="Gautami"/>
-        <a:font script="Taml" typeface="Latha"/>
-        <a:font script="Syrc" typeface="Estrangelo Edessa"/>
-        <a:font script="Orya" typeface="Kalinga"/>
-        <a:font script="Mlym" typeface="Kartika"/>
-        <a:font script="Laoo" typeface="DokChampa"/>
-        <a:font script="Sinh" typeface="Iskoola Pota"/>
-        <a:font script="Mong" typeface="Mongolian Baiti"/>
-        <a:font script="Viet" typeface="Times New Roman"/>
-        <a:font script="Uigh" typeface="Microsoft Uighur"/>
-        <a:font script="Geor" typeface="Sylfaen"/>
-      </a:majorFont>
-      <a:minorFont>
-        <a:latin typeface="Arial"/>
-        <a:ea typeface=""/>
-        <a:cs typeface=""/>
-        <a:font script="Jpan" typeface="ＭＳ Ｐゴシック"/>
-        <a:font script="Hang" typeface="맑은 고딕"/>
-        <a:font script="Hans" typeface="宋体"/>
-        <a:font script="Hant" typeface="新細明體"/>
-        <a:font script="Arab" typeface="Arial"/>
-        <a:font script="Hebr" typeface="Arial"/>
-        <a:font script="Thai" typeface="Cordia New"/>
-        <a:font script="Ethi" typeface="Nyala"/>
-        <a:font script="Beng" typeface="Vrinda"/>
-        <a:font script="Gujr" typeface="Shruti"/>
-        <a:font script="Khmr" typeface="DaunPenh"/>
-        <a:font script="Knda" typeface="Tunga"/>
-        <a:font script="Guru" typeface="Raavi"/>
-        <a:font script="Cans" typeface="Euphemia"/>
-        <a:font script="Cher" typeface="Plantagenet Cherokee"/>
-        <a:font script="Yiii" typeface="Microsoft Yi Baiti"/>
-        <a:font script="Tibt" typeface="Microsoft Himalaya"/>
-        <a:font script="Thaa" typeface="MV Boli"/>
-        <a:font script="Deva" typeface="Mangal"/>
-        <a:font script="Telu" typeface="Gautami"/>
-        <a:font script="Taml" typeface="Latha"/>
-        <a:font script="Syrc" typeface="Estrangelo Edessa"/>
-        <a:font script="Orya" typeface="Kalinga"/>
-        <a:font script="Mlym" typeface="Kartika"/>
-        <a:font script="Laoo" typeface="DokChampa"/>
-        <a:font script="Sinh" typeface="Iskoola Pota"/>
-        <a:font script="Mong" typeface="Mongolian Baiti"/>
-        <a:font script="Viet" typeface="Arial"/>
-        <a:font script="Uigh" typeface="Microsoft Uighur"/>
-        <a:font script="Geor" typeface="Sylfaen"/>
-      </a:minorFont>
-    </a:fontScheme>
-    <a:fmtScheme name="Office">
-      <a:fillStyleLst>
-        <a:solidFill>
-          <a:schemeClr val="phClr"/>
-        </a:solidFill>
-        <a:gradFill rotWithShape="1">
-          <a:gsLst>
-            <a:gs pos="0">
-              <a:schemeClr val="phClr">
-                <a:tint val="50000"/>
-                <a:satMod val="300000"/>
-              </a:schemeClr>
-            </a:gs>
-            <a:gs pos="35000">
-              <a:schemeClr val="phClr">
-                <a:tint val="37000"/>
-                <a:satMod val="300000"/>
-              </a:schemeClr>
-            </a:gs>
-            <a:gs pos="100000">
-              <a:schemeClr val="phClr">
-                <a:tint val="15000"/>
-                <a:satMod val="350000"/>
-              </a:schemeClr>
-            </a:gs>
-          </a:gsLst>
-          <a:lin ang="16200000" scaled="1"/>
-        </a:gradFill>
-        <a:gradFill rotWithShape="1">
-          <a:gsLst>
-            <a:gs pos="0">
-              <a:schemeClr val="phClr">
-                <a:tint val="100000"/>
-                <a:shade val="100000"/>
-                <a:satMod val="130000"/>
-              </a:schemeClr>
-            </a:gs>
-            <a:gs pos="100000">
-              <a:schemeClr val="phClr">
-                <a:tint val="50000"/>
-                <a:shade val="100000"/>
-                <a:satMod val="350000"/>
-              </a:schemeClr>
-            </a:gs>
-          </a:gsLst>
-          <a:lin ang="16200000" scaled="0"/>
-        </a:gradFill>
-      </a:fillStyleLst>
-      <a:lnStyleLst>
-        <a:ln w="9525" cap="flat" cmpd="sng" algn="ctr">
-          <a:solidFill>
-            <a:schemeClr val="phClr">
-              <a:shade val="95000"/>
-              <a:satMod val="105000"/>
-            </a:schemeClr>
-          </a:solidFill>
-          <a:prstDash val="solid"/>
-        </a:ln>
-        <a:ln w="25400" cap="flat" cmpd="sng" algn="ctr">
-          <a:solidFill>
-            <a:schemeClr val="phClr"/>
-          </a:solidFill>
-          <a:prstDash val="solid"/>
-        </a:ln>
-        <a:ln w="38100" cap="flat" cmpd="sng" algn="ctr">
-          <a:solidFill>
-            <a:schemeClr val="phClr"/>
-          </a:solidFill>
-          <a:prstDash val="solid"/>
-        </a:ln>
-      </a:lnStyleLst>
-      <a:effectStyleLst>
-        <a:effectStyle>
-          <a:effectLst>
-            <a:outerShdw blurRad="40000" dist="20000" dir="5400000" rotWithShape="0">
-              <a:srgbClr val="000000">
-                <a:alpha val="38000"/>
-              </a:srgbClr>
-            </a:outerShdw>
-          </a:effectLst>
-        </a:effectStyle>
-        <a:effectStyle>
-          <a:effectLst>
-            <a:outerShdw blurRad="40000" dist="23000" dir="5400000" rotWithShape="0">
-              <a:srgbClr val="000000">
-                <a:alpha val="35000"/>
-              </a:srgbClr>
-            </a:outerShdw>
-          </a:effectLst>
-        </a:effectStyle>
-        <a:effectStyle>
-          <a:effectLst>
-            <a:outerShdw blurRad="40000" dist="23000" dir="5400000" rotWithShape="0">
-              <a:srgbClr val="000000">
-                <a:alpha val="35000"/>
-              </a:srgbClr>
-            </a:outerShdw>
-          </a:effectLst>
-          <a:scene3d>
-            <a:camera prst="orthographicFront">
-              <a:rot lat="0" lon="0" rev="0"/>
-            </a:camera>
-            <a:lightRig rig="threePt" dir="t">
-              <a:rot lat="0" lon="0" rev="1200000"/>
-            </a:lightRig>
-          </a:scene3d>
-          <a:sp3d>
-            <a:bevelT w="63500" h="25400"/>
-          </a:sp3d>
-        </a:effectStyle>
-      </a:effectStyleLst>
-      <a:bgFillStyleLst>
-        <a:solidFill>
-          <a:schemeClr val="phClr"/>
-        </a:solidFill>
-        <a:gradFill rotWithShape="1">
-          <a:gsLst>
-            <a:gs pos="0">
-              <a:schemeClr val="phClr">
-                <a:tint val="40000"/>
-                <a:satMod val="350000"/>
-              </a:schemeClr>
-            </a:gs>
-            <a:gs pos="40000">
-              <a:schemeClr val="phClr">
-                <a:tint val="45000"/>
-                <a:shade val="99000"/>
-                <a:satMod val="350000"/>
-              </a:schemeClr>
-            </a:gs>
-            <a:gs pos="100000">
-              <a:schemeClr val="phClr">
-                <a:shade val="20000"/>
-                <a:satMod val="255000"/>
-              </a:schemeClr>
-            </a:gs>
-          </a:gsLst>
-          <a:path path="circle">
-            <a:fillToRect l="50000" t="-80000" r="50000" b="180000"/>
-          </a:path>
-        </a:gradFill>
-        <a:gradFill rotWithShape="1">
-          <a:gsLst>
-            <a:gs pos="0">
-              <a:schemeClr val="phClr">
-                <a:tint val="80000"/>
-                <a:satMod val="300000"/>
-              </a:schemeClr>
-            </a:gs>
-            <a:gs pos="100000">
-              <a:schemeClr val="phClr">
-                <a:shade val="30000"/>
-                <a:satMod val="200000"/>
-              </a:schemeClr>
-            </a:gs>
-          </a:gsLst>
-          <a:path path="circle">
-            <a:fillToRect l="50000" t="50000" r="50000" b="50000"/>
-          </a:path>
-        </a:gradFill>
-      </a:bgFillStyleLst>
-    </a:fmtScheme>
-  </a:themeElements>
-</a:theme>
-</file>
-
-<file path=ppt/theme/theme3.xml><?xml version="1.0" encoding="utf-8"?>
 <a:theme xmlns:a="http://schemas.openxmlformats.org/drawingml/2006/main" xmlns:r="http://schemas.openxmlformats.org/officeDocument/2006/relationships" name="Simple Light">
   <a:themeElements>
     <a:clrScheme name="Simple Light">
@@ -31748,7 +31469,7 @@
 </a:theme>
 </file>
 
-<file path=ppt/theme/theme4.xml><?xml version="1.0" encoding="utf-8"?>
+<file path=ppt/theme/theme3.xml><?xml version="1.0" encoding="utf-8"?>
 <a:theme xmlns:a="http://schemas.openxmlformats.org/drawingml/2006/main" xmlns:r="http://schemas.openxmlformats.org/officeDocument/2006/relationships">
   <a:themeElements>
     <a:clrScheme name="Default">
@@ -32025,4 +31746,283 @@
     </a:fmtScheme>
   </a:themeElements>
 </a:theme>
+</file>
+
+<file path=ppt/theme/theme4.xml><?xml version="1.0" encoding="utf-8"?>
+<a:theme xmlns:a="http://schemas.openxmlformats.org/drawingml/2006/main" xmlns:r="http://schemas.openxmlformats.org/officeDocument/2006/relationships" name="Geometric">
+  <a:themeElements>
+    <a:clrScheme name="Geometric">
+      <a:dk1>
+        <a:srgbClr val="2A3990"/>
+      </a:dk1>
+      <a:lt1>
+        <a:srgbClr val="FFFFFF"/>
+      </a:lt1>
+      <a:dk2>
+        <a:srgbClr val="434343"/>
+      </a:dk2>
+      <a:lt2>
+        <a:srgbClr val="999999"/>
+      </a:lt2>
+      <a:accent1>
+        <a:srgbClr val="212D74"/>
+      </a:accent1>
+      <a:accent2>
+        <a:srgbClr val="3949AB"/>
+      </a:accent2>
+      <a:accent3>
+        <a:srgbClr val="9C254D"/>
+      </a:accent3>
+      <a:accent4>
+        <a:srgbClr val="D23369"/>
+      </a:accent4>
+      <a:accent5>
+        <a:srgbClr val="F06292"/>
+      </a:accent5>
+      <a:accent6>
+        <a:srgbClr val="7890CD"/>
+      </a:accent6>
+      <a:hlink>
+        <a:srgbClr val="F06292"/>
+      </a:hlink>
+      <a:folHlink>
+        <a:srgbClr val="F06292"/>
+      </a:folHlink>
+    </a:clrScheme>
+    <a:fontScheme name="Office">
+      <a:majorFont>
+        <a:latin typeface="Arial"/>
+        <a:ea typeface=""/>
+        <a:cs typeface=""/>
+        <a:font script="Jpan" typeface="ＭＳ Ｐゴシック"/>
+        <a:font script="Hang" typeface="맑은 고딕"/>
+        <a:font script="Hans" typeface="宋体"/>
+        <a:font script="Hant" typeface="新細明體"/>
+        <a:font script="Arab" typeface="Times New Roman"/>
+        <a:font script="Hebr" typeface="Times New Roman"/>
+        <a:font script="Thai" typeface="Angsana New"/>
+        <a:font script="Ethi" typeface="Nyala"/>
+        <a:font script="Beng" typeface="Vrinda"/>
+        <a:font script="Gujr" typeface="Shruti"/>
+        <a:font script="Khmr" typeface="MoolBoran"/>
+        <a:font script="Knda" typeface="Tunga"/>
+        <a:font script="Guru" typeface="Raavi"/>
+        <a:font script="Cans" typeface="Euphemia"/>
+        <a:font script="Cher" typeface="Plantagenet Cherokee"/>
+        <a:font script="Yiii" typeface="Microsoft Yi Baiti"/>
+        <a:font script="Tibt" typeface="Microsoft Himalaya"/>
+        <a:font script="Thaa" typeface="MV Boli"/>
+        <a:font script="Deva" typeface="Mangal"/>
+        <a:font script="Telu" typeface="Gautami"/>
+        <a:font script="Taml" typeface="Latha"/>
+        <a:font script="Syrc" typeface="Estrangelo Edessa"/>
+        <a:font script="Orya" typeface="Kalinga"/>
+        <a:font script="Mlym" typeface="Kartika"/>
+        <a:font script="Laoo" typeface="DokChampa"/>
+        <a:font script="Sinh" typeface="Iskoola Pota"/>
+        <a:font script="Mong" typeface="Mongolian Baiti"/>
+        <a:font script="Viet" typeface="Times New Roman"/>
+        <a:font script="Uigh" typeface="Microsoft Uighur"/>
+        <a:font script="Geor" typeface="Sylfaen"/>
+      </a:majorFont>
+      <a:minorFont>
+        <a:latin typeface="Arial"/>
+        <a:ea typeface=""/>
+        <a:cs typeface=""/>
+        <a:font script="Jpan" typeface="ＭＳ Ｐゴシック"/>
+        <a:font script="Hang" typeface="맑은 고딕"/>
+        <a:font script="Hans" typeface="宋体"/>
+        <a:font script="Hant" typeface="新細明體"/>
+        <a:font script="Arab" typeface="Arial"/>
+        <a:font script="Hebr" typeface="Arial"/>
+        <a:font script="Thai" typeface="Cordia New"/>
+        <a:font script="Ethi" typeface="Nyala"/>
+        <a:font script="Beng" typeface="Vrinda"/>
+        <a:font script="Gujr" typeface="Shruti"/>
+        <a:font script="Khmr" typeface="DaunPenh"/>
+        <a:font script="Knda" typeface="Tunga"/>
+        <a:font script="Guru" typeface="Raavi"/>
+        <a:font script="Cans" typeface="Euphemia"/>
+        <a:font script="Cher" typeface="Plantagenet Cherokee"/>
+        <a:font script="Yiii" typeface="Microsoft Yi Baiti"/>
+        <a:font script="Tibt" typeface="Microsoft Himalaya"/>
+        <a:font script="Thaa" typeface="MV Boli"/>
+        <a:font script="Deva" typeface="Mangal"/>
+        <a:font script="Telu" typeface="Gautami"/>
+        <a:font script="Taml" typeface="Latha"/>
+        <a:font script="Syrc" typeface="Estrangelo Edessa"/>
+        <a:font script="Orya" typeface="Kalinga"/>
+        <a:font script="Mlym" typeface="Kartika"/>
+        <a:font script="Laoo" typeface="DokChampa"/>
+        <a:font script="Sinh" typeface="Iskoola Pota"/>
+        <a:font script="Mong" typeface="Mongolian Baiti"/>
+        <a:font script="Viet" typeface="Arial"/>
+        <a:font script="Uigh" typeface="Microsoft Uighur"/>
+        <a:font script="Geor" typeface="Sylfaen"/>
+      </a:minorFont>
+    </a:fontScheme>
+    <a:fmtScheme name="Office">
+      <a:fillStyleLst>
+        <a:solidFill>
+          <a:schemeClr val="phClr"/>
+        </a:solidFill>
+        <a:gradFill rotWithShape="1">
+          <a:gsLst>
+            <a:gs pos="0">
+              <a:schemeClr val="phClr">
+                <a:tint val="50000"/>
+                <a:satMod val="300000"/>
+              </a:schemeClr>
+            </a:gs>
+            <a:gs pos="35000">
+              <a:schemeClr val="phClr">
+                <a:tint val="37000"/>
+                <a:satMod val="300000"/>
+              </a:schemeClr>
+            </a:gs>
+            <a:gs pos="100000">
+              <a:schemeClr val="phClr">
+                <a:tint val="15000"/>
+                <a:satMod val="350000"/>
+              </a:schemeClr>
+            </a:gs>
+          </a:gsLst>
+          <a:lin ang="16200000" scaled="1"/>
+        </a:gradFill>
+        <a:gradFill rotWithShape="1">
+          <a:gsLst>
+            <a:gs pos="0">
+              <a:schemeClr val="phClr">
+                <a:tint val="100000"/>
+                <a:shade val="100000"/>
+                <a:satMod val="130000"/>
+              </a:schemeClr>
+            </a:gs>
+            <a:gs pos="100000">
+              <a:schemeClr val="phClr">
+                <a:tint val="50000"/>
+                <a:shade val="100000"/>
+                <a:satMod val="350000"/>
+              </a:schemeClr>
+            </a:gs>
+          </a:gsLst>
+          <a:lin ang="16200000" scaled="0"/>
+        </a:gradFill>
+      </a:fillStyleLst>
+      <a:lnStyleLst>
+        <a:ln w="9525" cap="flat" cmpd="sng" algn="ctr">
+          <a:solidFill>
+            <a:schemeClr val="phClr">
+              <a:shade val="95000"/>
+              <a:satMod val="105000"/>
+            </a:schemeClr>
+          </a:solidFill>
+          <a:prstDash val="solid"/>
+        </a:ln>
+        <a:ln w="25400" cap="flat" cmpd="sng" algn="ctr">
+          <a:solidFill>
+            <a:schemeClr val="phClr"/>
+          </a:solidFill>
+          <a:prstDash val="solid"/>
+        </a:ln>
+        <a:ln w="38100" cap="flat" cmpd="sng" algn="ctr">
+          <a:solidFill>
+            <a:schemeClr val="phClr"/>
+          </a:solidFill>
+          <a:prstDash val="solid"/>
+        </a:ln>
+      </a:lnStyleLst>
+      <a:effectStyleLst>
+        <a:effectStyle>
+          <a:effectLst>
+            <a:outerShdw blurRad="40000" dist="20000" dir="5400000" rotWithShape="0">
+              <a:srgbClr val="000000">
+                <a:alpha val="38000"/>
+              </a:srgbClr>
+            </a:outerShdw>
+          </a:effectLst>
+        </a:effectStyle>
+        <a:effectStyle>
+          <a:effectLst>
+            <a:outerShdw blurRad="40000" dist="23000" dir="5400000" rotWithShape="0">
+              <a:srgbClr val="000000">
+                <a:alpha val="35000"/>
+              </a:srgbClr>
+            </a:outerShdw>
+          </a:effectLst>
+        </a:effectStyle>
+        <a:effectStyle>
+          <a:effectLst>
+            <a:outerShdw blurRad="40000" dist="23000" dir="5400000" rotWithShape="0">
+              <a:srgbClr val="000000">
+                <a:alpha val="35000"/>
+              </a:srgbClr>
+            </a:outerShdw>
+          </a:effectLst>
+          <a:scene3d>
+            <a:camera prst="orthographicFront">
+              <a:rot lat="0" lon="0" rev="0"/>
+            </a:camera>
+            <a:lightRig rig="threePt" dir="t">
+              <a:rot lat="0" lon="0" rev="1200000"/>
+            </a:lightRig>
+          </a:scene3d>
+          <a:sp3d>
+            <a:bevelT w="63500" h="25400"/>
+          </a:sp3d>
+        </a:effectStyle>
+      </a:effectStyleLst>
+      <a:bgFillStyleLst>
+        <a:solidFill>
+          <a:schemeClr val="phClr"/>
+        </a:solidFill>
+        <a:gradFill rotWithShape="1">
+          <a:gsLst>
+            <a:gs pos="0">
+              <a:schemeClr val="phClr">
+                <a:tint val="40000"/>
+                <a:satMod val="350000"/>
+              </a:schemeClr>
+            </a:gs>
+            <a:gs pos="40000">
+              <a:schemeClr val="phClr">
+                <a:tint val="45000"/>
+                <a:shade val="99000"/>
+                <a:satMod val="350000"/>
+              </a:schemeClr>
+            </a:gs>
+            <a:gs pos="100000">
+              <a:schemeClr val="phClr">
+                <a:shade val="20000"/>
+                <a:satMod val="255000"/>
+              </a:schemeClr>
+            </a:gs>
+          </a:gsLst>
+          <a:path path="circle">
+            <a:fillToRect l="50000" t="-80000" r="50000" b="180000"/>
+          </a:path>
+        </a:gradFill>
+        <a:gradFill rotWithShape="1">
+          <a:gsLst>
+            <a:gs pos="0">
+              <a:schemeClr val="phClr">
+                <a:tint val="80000"/>
+                <a:satMod val="300000"/>
+              </a:schemeClr>
+            </a:gs>
+            <a:gs pos="100000">
+              <a:schemeClr val="phClr">
+                <a:shade val="30000"/>
+                <a:satMod val="200000"/>
+              </a:schemeClr>
+            </a:gs>
+          </a:gsLst>
+          <a:path path="circle">
+            <a:fillToRect l="50000" t="50000" r="50000" b="50000"/>
+          </a:path>
+        </a:gradFill>
+      </a:bgFillStyleLst>
+    </a:fmtScheme>
+  </a:themeElements>
+</a:theme>
 </file>
</xml_diff>

<commit_message>
remove head system command from live demo and exercises
</commit_message>
<xml_diff>
--- a/Day_2/Lectures/Day_2_Lecture_1_Data_Collection_Data_Preparation.pptx
+++ b/Day_2/Lectures/Day_2_Lecture_1_Data_Collection_Data_Preparation.pptx
@@ -30912,6 +30912,564 @@
 </file>
 
 <file path=ppt/theme/theme1.xml><?xml version="1.0" encoding="utf-8"?>
+<a:theme xmlns:a="http://schemas.openxmlformats.org/drawingml/2006/main" xmlns:r="http://schemas.openxmlformats.org/officeDocument/2006/relationships">
+  <a:themeElements>
+    <a:clrScheme name="Default">
+      <a:dk1>
+        <a:srgbClr val="000000"/>
+      </a:dk1>
+      <a:lt1>
+        <a:srgbClr val="FFFFFF"/>
+      </a:lt1>
+      <a:dk2>
+        <a:srgbClr val="158158"/>
+      </a:dk2>
+      <a:lt2>
+        <a:srgbClr val="F3F3F3"/>
+      </a:lt2>
+      <a:accent1>
+        <a:srgbClr val="058DC7"/>
+      </a:accent1>
+      <a:accent2>
+        <a:srgbClr val="50B432"/>
+      </a:accent2>
+      <a:accent3>
+        <a:srgbClr val="ED561B"/>
+      </a:accent3>
+      <a:accent4>
+        <a:srgbClr val="EDEF00"/>
+      </a:accent4>
+      <a:accent5>
+        <a:srgbClr val="24CBE5"/>
+      </a:accent5>
+      <a:accent6>
+        <a:srgbClr val="64E572"/>
+      </a:accent6>
+      <a:hlink>
+        <a:srgbClr val="2200CC"/>
+      </a:hlink>
+      <a:folHlink>
+        <a:srgbClr val="551A8B"/>
+      </a:folHlink>
+    </a:clrScheme>
+    <a:fontScheme name="Office">
+      <a:majorFont>
+        <a:latin typeface="Arial"/>
+        <a:ea typeface=""/>
+        <a:cs typeface=""/>
+        <a:font script="Jpan" typeface="ＭＳ Ｐゴシック"/>
+        <a:font script="Hang" typeface="맑은 고딕"/>
+        <a:font script="Hans" typeface="宋体"/>
+        <a:font script="Hant" typeface="新細明體"/>
+        <a:font script="Arab" typeface="Times New Roman"/>
+        <a:font script="Hebr" typeface="Times New Roman"/>
+        <a:font script="Thai" typeface="Angsana New"/>
+        <a:font script="Ethi" typeface="Nyala"/>
+        <a:font script="Beng" typeface="Vrinda"/>
+        <a:font script="Gujr" typeface="Shruti"/>
+        <a:font script="Khmr" typeface="MoolBoran"/>
+        <a:font script="Knda" typeface="Tunga"/>
+        <a:font script="Guru" typeface="Raavi"/>
+        <a:font script="Cans" typeface="Euphemia"/>
+        <a:font script="Cher" typeface="Plantagenet Cherokee"/>
+        <a:font script="Yiii" typeface="Microsoft Yi Baiti"/>
+        <a:font script="Tibt" typeface="Microsoft Himalaya"/>
+        <a:font script="Thaa" typeface="MV Boli"/>
+        <a:font script="Deva" typeface="Mangal"/>
+        <a:font script="Telu" typeface="Gautami"/>
+        <a:font script="Taml" typeface="Latha"/>
+        <a:font script="Syrc" typeface="Estrangelo Edessa"/>
+        <a:font script="Orya" typeface="Kalinga"/>
+        <a:font script="Mlym" typeface="Kartika"/>
+        <a:font script="Laoo" typeface="DokChampa"/>
+        <a:font script="Sinh" typeface="Iskoola Pota"/>
+        <a:font script="Mong" typeface="Mongolian Baiti"/>
+        <a:font script="Viet" typeface="Times New Roman"/>
+        <a:font script="Uigh" typeface="Microsoft Uighur"/>
+        <a:font script="Geor" typeface="Sylfaen"/>
+      </a:majorFont>
+      <a:minorFont>
+        <a:latin typeface="Arial"/>
+        <a:ea typeface=""/>
+        <a:cs typeface=""/>
+        <a:font script="Jpan" typeface="ＭＳ Ｐゴシック"/>
+        <a:font script="Hang" typeface="맑은 고딕"/>
+        <a:font script="Hans" typeface="宋体"/>
+        <a:font script="Hant" typeface="新細明體"/>
+        <a:font script="Arab" typeface="Arial"/>
+        <a:font script="Hebr" typeface="Arial"/>
+        <a:font script="Thai" typeface="Cordia New"/>
+        <a:font script="Ethi" typeface="Nyala"/>
+        <a:font script="Beng" typeface="Vrinda"/>
+        <a:font script="Gujr" typeface="Shruti"/>
+        <a:font script="Khmr" typeface="DaunPenh"/>
+        <a:font script="Knda" typeface="Tunga"/>
+        <a:font script="Guru" typeface="Raavi"/>
+        <a:font script="Cans" typeface="Euphemia"/>
+        <a:font script="Cher" typeface="Plantagenet Cherokee"/>
+        <a:font script="Yiii" typeface="Microsoft Yi Baiti"/>
+        <a:font script="Tibt" typeface="Microsoft Himalaya"/>
+        <a:font script="Thaa" typeface="MV Boli"/>
+        <a:font script="Deva" typeface="Mangal"/>
+        <a:font script="Telu" typeface="Gautami"/>
+        <a:font script="Taml" typeface="Latha"/>
+        <a:font script="Syrc" typeface="Estrangelo Edessa"/>
+        <a:font script="Orya" typeface="Kalinga"/>
+        <a:font script="Mlym" typeface="Kartika"/>
+        <a:font script="Laoo" typeface="DokChampa"/>
+        <a:font script="Sinh" typeface="Iskoola Pota"/>
+        <a:font script="Mong" typeface="Mongolian Baiti"/>
+        <a:font script="Viet" typeface="Arial"/>
+        <a:font script="Uigh" typeface="Microsoft Uighur"/>
+        <a:font script="Geor" typeface="Sylfaen"/>
+      </a:minorFont>
+    </a:fontScheme>
+    <a:fmtScheme name="Office">
+      <a:fillStyleLst>
+        <a:solidFill>
+          <a:schemeClr val="phClr"/>
+        </a:solidFill>
+        <a:gradFill rotWithShape="1">
+          <a:gsLst>
+            <a:gs pos="0">
+              <a:schemeClr val="phClr">
+                <a:tint val="50000"/>
+                <a:satMod val="300000"/>
+              </a:schemeClr>
+            </a:gs>
+            <a:gs pos="35000">
+              <a:schemeClr val="phClr">
+                <a:tint val="37000"/>
+                <a:satMod val="300000"/>
+              </a:schemeClr>
+            </a:gs>
+            <a:gs pos="100000">
+              <a:schemeClr val="phClr">
+                <a:tint val="15000"/>
+                <a:satMod val="350000"/>
+              </a:schemeClr>
+            </a:gs>
+          </a:gsLst>
+          <a:lin ang="16200000" scaled="1"/>
+        </a:gradFill>
+        <a:gradFill rotWithShape="1">
+          <a:gsLst>
+            <a:gs pos="0">
+              <a:schemeClr val="phClr">
+                <a:tint val="100000"/>
+                <a:shade val="100000"/>
+                <a:satMod val="130000"/>
+              </a:schemeClr>
+            </a:gs>
+            <a:gs pos="100000">
+              <a:schemeClr val="phClr">
+                <a:tint val="50000"/>
+                <a:shade val="100000"/>
+                <a:satMod val="350000"/>
+              </a:schemeClr>
+            </a:gs>
+          </a:gsLst>
+          <a:lin ang="16200000" scaled="0"/>
+        </a:gradFill>
+      </a:fillStyleLst>
+      <a:lnStyleLst>
+        <a:ln w="9525" cap="flat" cmpd="sng" algn="ctr">
+          <a:solidFill>
+            <a:schemeClr val="phClr">
+              <a:shade val="95000"/>
+              <a:satMod val="105000"/>
+            </a:schemeClr>
+          </a:solidFill>
+          <a:prstDash val="solid"/>
+        </a:ln>
+        <a:ln w="25400" cap="flat" cmpd="sng" algn="ctr">
+          <a:solidFill>
+            <a:schemeClr val="phClr"/>
+          </a:solidFill>
+          <a:prstDash val="solid"/>
+        </a:ln>
+        <a:ln w="38100" cap="flat" cmpd="sng" algn="ctr">
+          <a:solidFill>
+            <a:schemeClr val="phClr"/>
+          </a:solidFill>
+          <a:prstDash val="solid"/>
+        </a:ln>
+      </a:lnStyleLst>
+      <a:effectStyleLst>
+        <a:effectStyle>
+          <a:effectLst>
+            <a:outerShdw blurRad="40000" dist="20000" dir="5400000" rotWithShape="0">
+              <a:srgbClr val="000000">
+                <a:alpha val="38000"/>
+              </a:srgbClr>
+            </a:outerShdw>
+          </a:effectLst>
+        </a:effectStyle>
+        <a:effectStyle>
+          <a:effectLst>
+            <a:outerShdw blurRad="40000" dist="23000" dir="5400000" rotWithShape="0">
+              <a:srgbClr val="000000">
+                <a:alpha val="35000"/>
+              </a:srgbClr>
+            </a:outerShdw>
+          </a:effectLst>
+        </a:effectStyle>
+        <a:effectStyle>
+          <a:effectLst>
+            <a:outerShdw blurRad="40000" dist="23000" dir="5400000" rotWithShape="0">
+              <a:srgbClr val="000000">
+                <a:alpha val="35000"/>
+              </a:srgbClr>
+            </a:outerShdw>
+          </a:effectLst>
+          <a:scene3d>
+            <a:camera prst="orthographicFront">
+              <a:rot lat="0" lon="0" rev="0"/>
+            </a:camera>
+            <a:lightRig rig="threePt" dir="t">
+              <a:rot lat="0" lon="0" rev="1200000"/>
+            </a:lightRig>
+          </a:scene3d>
+          <a:sp3d>
+            <a:bevelT w="63500" h="25400"/>
+          </a:sp3d>
+        </a:effectStyle>
+      </a:effectStyleLst>
+      <a:bgFillStyleLst>
+        <a:solidFill>
+          <a:schemeClr val="phClr"/>
+        </a:solidFill>
+        <a:gradFill rotWithShape="1">
+          <a:gsLst>
+            <a:gs pos="0">
+              <a:schemeClr val="phClr">
+                <a:tint val="40000"/>
+                <a:satMod val="350000"/>
+              </a:schemeClr>
+            </a:gs>
+            <a:gs pos="40000">
+              <a:schemeClr val="phClr">
+                <a:tint val="45000"/>
+                <a:shade val="99000"/>
+                <a:satMod val="350000"/>
+              </a:schemeClr>
+            </a:gs>
+            <a:gs pos="100000">
+              <a:schemeClr val="phClr">
+                <a:shade val="20000"/>
+                <a:satMod val="255000"/>
+              </a:schemeClr>
+            </a:gs>
+          </a:gsLst>
+          <a:path path="circle">
+            <a:fillToRect l="50000" t="-80000" r="50000" b="180000"/>
+          </a:path>
+        </a:gradFill>
+        <a:gradFill rotWithShape="1">
+          <a:gsLst>
+            <a:gs pos="0">
+              <a:schemeClr val="phClr">
+                <a:tint val="80000"/>
+                <a:satMod val="300000"/>
+              </a:schemeClr>
+            </a:gs>
+            <a:gs pos="100000">
+              <a:schemeClr val="phClr">
+                <a:shade val="30000"/>
+                <a:satMod val="200000"/>
+              </a:schemeClr>
+            </a:gs>
+          </a:gsLst>
+          <a:path path="circle">
+            <a:fillToRect l="50000" t="50000" r="50000" b="50000"/>
+          </a:path>
+        </a:gradFill>
+      </a:bgFillStyleLst>
+    </a:fmtScheme>
+  </a:themeElements>
+</a:theme>
+</file>
+
+<file path=ppt/theme/theme2.xml><?xml version="1.0" encoding="utf-8"?>
+<a:theme xmlns:a="http://schemas.openxmlformats.org/drawingml/2006/main" xmlns:r="http://schemas.openxmlformats.org/officeDocument/2006/relationships" name="Geometric">
+  <a:themeElements>
+    <a:clrScheme name="Geometric">
+      <a:dk1>
+        <a:srgbClr val="2A3990"/>
+      </a:dk1>
+      <a:lt1>
+        <a:srgbClr val="FFFFFF"/>
+      </a:lt1>
+      <a:dk2>
+        <a:srgbClr val="434343"/>
+      </a:dk2>
+      <a:lt2>
+        <a:srgbClr val="999999"/>
+      </a:lt2>
+      <a:accent1>
+        <a:srgbClr val="212D74"/>
+      </a:accent1>
+      <a:accent2>
+        <a:srgbClr val="3949AB"/>
+      </a:accent2>
+      <a:accent3>
+        <a:srgbClr val="9C254D"/>
+      </a:accent3>
+      <a:accent4>
+        <a:srgbClr val="D23369"/>
+      </a:accent4>
+      <a:accent5>
+        <a:srgbClr val="F06292"/>
+      </a:accent5>
+      <a:accent6>
+        <a:srgbClr val="7890CD"/>
+      </a:accent6>
+      <a:hlink>
+        <a:srgbClr val="F06292"/>
+      </a:hlink>
+      <a:folHlink>
+        <a:srgbClr val="F06292"/>
+      </a:folHlink>
+    </a:clrScheme>
+    <a:fontScheme name="Office">
+      <a:majorFont>
+        <a:latin typeface="Arial"/>
+        <a:ea typeface=""/>
+        <a:cs typeface=""/>
+        <a:font script="Jpan" typeface="ＭＳ Ｐゴシック"/>
+        <a:font script="Hang" typeface="맑은 고딕"/>
+        <a:font script="Hans" typeface="宋体"/>
+        <a:font script="Hant" typeface="新細明體"/>
+        <a:font script="Arab" typeface="Times New Roman"/>
+        <a:font script="Hebr" typeface="Times New Roman"/>
+        <a:font script="Thai" typeface="Angsana New"/>
+        <a:font script="Ethi" typeface="Nyala"/>
+        <a:font script="Beng" typeface="Vrinda"/>
+        <a:font script="Gujr" typeface="Shruti"/>
+        <a:font script="Khmr" typeface="MoolBoran"/>
+        <a:font script="Knda" typeface="Tunga"/>
+        <a:font script="Guru" typeface="Raavi"/>
+        <a:font script="Cans" typeface="Euphemia"/>
+        <a:font script="Cher" typeface="Plantagenet Cherokee"/>
+        <a:font script="Yiii" typeface="Microsoft Yi Baiti"/>
+        <a:font script="Tibt" typeface="Microsoft Himalaya"/>
+        <a:font script="Thaa" typeface="MV Boli"/>
+        <a:font script="Deva" typeface="Mangal"/>
+        <a:font script="Telu" typeface="Gautami"/>
+        <a:font script="Taml" typeface="Latha"/>
+        <a:font script="Syrc" typeface="Estrangelo Edessa"/>
+        <a:font script="Orya" typeface="Kalinga"/>
+        <a:font script="Mlym" typeface="Kartika"/>
+        <a:font script="Laoo" typeface="DokChampa"/>
+        <a:font script="Sinh" typeface="Iskoola Pota"/>
+        <a:font script="Mong" typeface="Mongolian Baiti"/>
+        <a:font script="Viet" typeface="Times New Roman"/>
+        <a:font script="Uigh" typeface="Microsoft Uighur"/>
+        <a:font script="Geor" typeface="Sylfaen"/>
+      </a:majorFont>
+      <a:minorFont>
+        <a:latin typeface="Arial"/>
+        <a:ea typeface=""/>
+        <a:cs typeface=""/>
+        <a:font script="Jpan" typeface="ＭＳ Ｐゴシック"/>
+        <a:font script="Hang" typeface="맑은 고딕"/>
+        <a:font script="Hans" typeface="宋体"/>
+        <a:font script="Hant" typeface="新細明體"/>
+        <a:font script="Arab" typeface="Arial"/>
+        <a:font script="Hebr" typeface="Arial"/>
+        <a:font script="Thai" typeface="Cordia New"/>
+        <a:font script="Ethi" typeface="Nyala"/>
+        <a:font script="Beng" typeface="Vrinda"/>
+        <a:font script="Gujr" typeface="Shruti"/>
+        <a:font script="Khmr" typeface="DaunPenh"/>
+        <a:font script="Knda" typeface="Tunga"/>
+        <a:font script="Guru" typeface="Raavi"/>
+        <a:font script="Cans" typeface="Euphemia"/>
+        <a:font script="Cher" typeface="Plantagenet Cherokee"/>
+        <a:font script="Yiii" typeface="Microsoft Yi Baiti"/>
+        <a:font script="Tibt" typeface="Microsoft Himalaya"/>
+        <a:font script="Thaa" typeface="MV Boli"/>
+        <a:font script="Deva" typeface="Mangal"/>
+        <a:font script="Telu" typeface="Gautami"/>
+        <a:font script="Taml" typeface="Latha"/>
+        <a:font script="Syrc" typeface="Estrangelo Edessa"/>
+        <a:font script="Orya" typeface="Kalinga"/>
+        <a:font script="Mlym" typeface="Kartika"/>
+        <a:font script="Laoo" typeface="DokChampa"/>
+        <a:font script="Sinh" typeface="Iskoola Pota"/>
+        <a:font script="Mong" typeface="Mongolian Baiti"/>
+        <a:font script="Viet" typeface="Arial"/>
+        <a:font script="Uigh" typeface="Microsoft Uighur"/>
+        <a:font script="Geor" typeface="Sylfaen"/>
+      </a:minorFont>
+    </a:fontScheme>
+    <a:fmtScheme name="Office">
+      <a:fillStyleLst>
+        <a:solidFill>
+          <a:schemeClr val="phClr"/>
+        </a:solidFill>
+        <a:gradFill rotWithShape="1">
+          <a:gsLst>
+            <a:gs pos="0">
+              <a:schemeClr val="phClr">
+                <a:tint val="50000"/>
+                <a:satMod val="300000"/>
+              </a:schemeClr>
+            </a:gs>
+            <a:gs pos="35000">
+              <a:schemeClr val="phClr">
+                <a:tint val="37000"/>
+                <a:satMod val="300000"/>
+              </a:schemeClr>
+            </a:gs>
+            <a:gs pos="100000">
+              <a:schemeClr val="phClr">
+                <a:tint val="15000"/>
+                <a:satMod val="350000"/>
+              </a:schemeClr>
+            </a:gs>
+          </a:gsLst>
+          <a:lin ang="16200000" scaled="1"/>
+        </a:gradFill>
+        <a:gradFill rotWithShape="1">
+          <a:gsLst>
+            <a:gs pos="0">
+              <a:schemeClr val="phClr">
+                <a:tint val="100000"/>
+                <a:shade val="100000"/>
+                <a:satMod val="130000"/>
+              </a:schemeClr>
+            </a:gs>
+            <a:gs pos="100000">
+              <a:schemeClr val="phClr">
+                <a:tint val="50000"/>
+                <a:shade val="100000"/>
+                <a:satMod val="350000"/>
+              </a:schemeClr>
+            </a:gs>
+          </a:gsLst>
+          <a:lin ang="16200000" scaled="0"/>
+        </a:gradFill>
+      </a:fillStyleLst>
+      <a:lnStyleLst>
+        <a:ln w="9525" cap="flat" cmpd="sng" algn="ctr">
+          <a:solidFill>
+            <a:schemeClr val="phClr">
+              <a:shade val="95000"/>
+              <a:satMod val="105000"/>
+            </a:schemeClr>
+          </a:solidFill>
+          <a:prstDash val="solid"/>
+        </a:ln>
+        <a:ln w="25400" cap="flat" cmpd="sng" algn="ctr">
+          <a:solidFill>
+            <a:schemeClr val="phClr"/>
+          </a:solidFill>
+          <a:prstDash val="solid"/>
+        </a:ln>
+        <a:ln w="38100" cap="flat" cmpd="sng" algn="ctr">
+          <a:solidFill>
+            <a:schemeClr val="phClr"/>
+          </a:solidFill>
+          <a:prstDash val="solid"/>
+        </a:ln>
+      </a:lnStyleLst>
+      <a:effectStyleLst>
+        <a:effectStyle>
+          <a:effectLst>
+            <a:outerShdw blurRad="40000" dist="20000" dir="5400000" rotWithShape="0">
+              <a:srgbClr val="000000">
+                <a:alpha val="38000"/>
+              </a:srgbClr>
+            </a:outerShdw>
+          </a:effectLst>
+        </a:effectStyle>
+        <a:effectStyle>
+          <a:effectLst>
+            <a:outerShdw blurRad="40000" dist="23000" dir="5400000" rotWithShape="0">
+              <a:srgbClr val="000000">
+                <a:alpha val="35000"/>
+              </a:srgbClr>
+            </a:outerShdw>
+          </a:effectLst>
+        </a:effectStyle>
+        <a:effectStyle>
+          <a:effectLst>
+            <a:outerShdw blurRad="40000" dist="23000" dir="5400000" rotWithShape="0">
+              <a:srgbClr val="000000">
+                <a:alpha val="35000"/>
+              </a:srgbClr>
+            </a:outerShdw>
+          </a:effectLst>
+          <a:scene3d>
+            <a:camera prst="orthographicFront">
+              <a:rot lat="0" lon="0" rev="0"/>
+            </a:camera>
+            <a:lightRig rig="threePt" dir="t">
+              <a:rot lat="0" lon="0" rev="1200000"/>
+            </a:lightRig>
+          </a:scene3d>
+          <a:sp3d>
+            <a:bevelT w="63500" h="25400"/>
+          </a:sp3d>
+        </a:effectStyle>
+      </a:effectStyleLst>
+      <a:bgFillStyleLst>
+        <a:solidFill>
+          <a:schemeClr val="phClr"/>
+        </a:solidFill>
+        <a:gradFill rotWithShape="1">
+          <a:gsLst>
+            <a:gs pos="0">
+              <a:schemeClr val="phClr">
+                <a:tint val="40000"/>
+                <a:satMod val="350000"/>
+              </a:schemeClr>
+            </a:gs>
+            <a:gs pos="40000">
+              <a:schemeClr val="phClr">
+                <a:tint val="45000"/>
+                <a:shade val="99000"/>
+                <a:satMod val="350000"/>
+              </a:schemeClr>
+            </a:gs>
+            <a:gs pos="100000">
+              <a:schemeClr val="phClr">
+                <a:shade val="20000"/>
+                <a:satMod val="255000"/>
+              </a:schemeClr>
+            </a:gs>
+          </a:gsLst>
+          <a:path path="circle">
+            <a:fillToRect l="50000" t="-80000" r="50000" b="180000"/>
+          </a:path>
+        </a:gradFill>
+        <a:gradFill rotWithShape="1">
+          <a:gsLst>
+            <a:gs pos="0">
+              <a:schemeClr val="phClr">
+                <a:tint val="80000"/>
+                <a:satMod val="300000"/>
+              </a:schemeClr>
+            </a:gs>
+            <a:gs pos="100000">
+              <a:schemeClr val="phClr">
+                <a:shade val="30000"/>
+                <a:satMod val="200000"/>
+              </a:schemeClr>
+            </a:gs>
+          </a:gsLst>
+          <a:path path="circle">
+            <a:fillToRect l="50000" t="50000" r="50000" b="50000"/>
+          </a:path>
+        </a:gradFill>
+      </a:bgFillStyleLst>
+    </a:fmtScheme>
+  </a:themeElements>
+</a:theme>
+</file>
+
+<file path=ppt/theme/theme3.xml><?xml version="1.0" encoding="utf-8"?>
 <a:theme xmlns:a="http://schemas.openxmlformats.org/drawingml/2006/main" xmlns:r="http://schemas.openxmlformats.org/officeDocument/2006/relationships" name="Simple Light">
   <a:themeElements>
     <a:clrScheme name="Simple Light">
@@ -31190,7 +31748,7 @@
 </a:theme>
 </file>
 
-<file path=ppt/theme/theme2.xml><?xml version="1.0" encoding="utf-8"?>
+<file path=ppt/theme/theme4.xml><?xml version="1.0" encoding="utf-8"?>
 <a:theme xmlns:a="http://schemas.openxmlformats.org/drawingml/2006/main" xmlns:r="http://schemas.openxmlformats.org/officeDocument/2006/relationships" name="Simple Light">
   <a:themeElements>
     <a:clrScheme name="Simple Light">
@@ -31467,562 +32025,4 @@
     </a:fmtScheme>
   </a:themeElements>
 </a:theme>
-</file>
-
-<file path=ppt/theme/theme3.xml><?xml version="1.0" encoding="utf-8"?>
-<a:theme xmlns:a="http://schemas.openxmlformats.org/drawingml/2006/main" xmlns:r="http://schemas.openxmlformats.org/officeDocument/2006/relationships">
-  <a:themeElements>
-    <a:clrScheme name="Default">
-      <a:dk1>
-        <a:srgbClr val="000000"/>
-      </a:dk1>
-      <a:lt1>
-        <a:srgbClr val="FFFFFF"/>
-      </a:lt1>
-      <a:dk2>
-        <a:srgbClr val="158158"/>
-      </a:dk2>
-      <a:lt2>
-        <a:srgbClr val="F3F3F3"/>
-      </a:lt2>
-      <a:accent1>
-        <a:srgbClr val="058DC7"/>
-      </a:accent1>
-      <a:accent2>
-        <a:srgbClr val="50B432"/>
-      </a:accent2>
-      <a:accent3>
-        <a:srgbClr val="ED561B"/>
-      </a:accent3>
-      <a:accent4>
-        <a:srgbClr val="EDEF00"/>
-      </a:accent4>
-      <a:accent5>
-        <a:srgbClr val="24CBE5"/>
-      </a:accent5>
-      <a:accent6>
-        <a:srgbClr val="64E572"/>
-      </a:accent6>
-      <a:hlink>
-        <a:srgbClr val="2200CC"/>
-      </a:hlink>
-      <a:folHlink>
-        <a:srgbClr val="551A8B"/>
-      </a:folHlink>
-    </a:clrScheme>
-    <a:fontScheme name="Office">
-      <a:majorFont>
-        <a:latin typeface="Arial"/>
-        <a:ea typeface=""/>
-        <a:cs typeface=""/>
-        <a:font script="Jpan" typeface="ＭＳ Ｐゴシック"/>
-        <a:font script="Hang" typeface="맑은 고딕"/>
-        <a:font script="Hans" typeface="宋体"/>
-        <a:font script="Hant" typeface="新細明體"/>
-        <a:font script="Arab" typeface="Times New Roman"/>
-        <a:font script="Hebr" typeface="Times New Roman"/>
-        <a:font script="Thai" typeface="Angsana New"/>
-        <a:font script="Ethi" typeface="Nyala"/>
-        <a:font script="Beng" typeface="Vrinda"/>
-        <a:font script="Gujr" typeface="Shruti"/>
-        <a:font script="Khmr" typeface="MoolBoran"/>
-        <a:font script="Knda" typeface="Tunga"/>
-        <a:font script="Guru" typeface="Raavi"/>
-        <a:font script="Cans" typeface="Euphemia"/>
-        <a:font script="Cher" typeface="Plantagenet Cherokee"/>
-        <a:font script="Yiii" typeface="Microsoft Yi Baiti"/>
-        <a:font script="Tibt" typeface="Microsoft Himalaya"/>
-        <a:font script="Thaa" typeface="MV Boli"/>
-        <a:font script="Deva" typeface="Mangal"/>
-        <a:font script="Telu" typeface="Gautami"/>
-        <a:font script="Taml" typeface="Latha"/>
-        <a:font script="Syrc" typeface="Estrangelo Edessa"/>
-        <a:font script="Orya" typeface="Kalinga"/>
-        <a:font script="Mlym" typeface="Kartika"/>
-        <a:font script="Laoo" typeface="DokChampa"/>
-        <a:font script="Sinh" typeface="Iskoola Pota"/>
-        <a:font script="Mong" typeface="Mongolian Baiti"/>
-        <a:font script="Viet" typeface="Times New Roman"/>
-        <a:font script="Uigh" typeface="Microsoft Uighur"/>
-        <a:font script="Geor" typeface="Sylfaen"/>
-      </a:majorFont>
-      <a:minorFont>
-        <a:latin typeface="Arial"/>
-        <a:ea typeface=""/>
-        <a:cs typeface=""/>
-        <a:font script="Jpan" typeface="ＭＳ Ｐゴシック"/>
-        <a:font script="Hang" typeface="맑은 고딕"/>
-        <a:font script="Hans" typeface="宋体"/>
-        <a:font script="Hant" typeface="新細明體"/>
-        <a:font script="Arab" typeface="Arial"/>
-        <a:font script="Hebr" typeface="Arial"/>
-        <a:font script="Thai" typeface="Cordia New"/>
-        <a:font script="Ethi" typeface="Nyala"/>
-        <a:font script="Beng" typeface="Vrinda"/>
-        <a:font script="Gujr" typeface="Shruti"/>
-        <a:font script="Khmr" typeface="DaunPenh"/>
-        <a:font script="Knda" typeface="Tunga"/>
-        <a:font script="Guru" typeface="Raavi"/>
-        <a:font script="Cans" typeface="Euphemia"/>
-        <a:font script="Cher" typeface="Plantagenet Cherokee"/>
-        <a:font script="Yiii" typeface="Microsoft Yi Baiti"/>
-        <a:font script="Tibt" typeface="Microsoft Himalaya"/>
-        <a:font script="Thaa" typeface="MV Boli"/>
-        <a:font script="Deva" typeface="Mangal"/>
-        <a:font script="Telu" typeface="Gautami"/>
-        <a:font script="Taml" typeface="Latha"/>
-        <a:font script="Syrc" typeface="Estrangelo Edessa"/>
-        <a:font script="Orya" typeface="Kalinga"/>
-        <a:font script="Mlym" typeface="Kartika"/>
-        <a:font script="Laoo" typeface="DokChampa"/>
-        <a:font script="Sinh" typeface="Iskoola Pota"/>
-        <a:font script="Mong" typeface="Mongolian Baiti"/>
-        <a:font script="Viet" typeface="Arial"/>
-        <a:font script="Uigh" typeface="Microsoft Uighur"/>
-        <a:font script="Geor" typeface="Sylfaen"/>
-      </a:minorFont>
-    </a:fontScheme>
-    <a:fmtScheme name="Office">
-      <a:fillStyleLst>
-        <a:solidFill>
-          <a:schemeClr val="phClr"/>
-        </a:solidFill>
-        <a:gradFill rotWithShape="1">
-          <a:gsLst>
-            <a:gs pos="0">
-              <a:schemeClr val="phClr">
-                <a:tint val="50000"/>
-                <a:satMod val="300000"/>
-              </a:schemeClr>
-            </a:gs>
-            <a:gs pos="35000">
-              <a:schemeClr val="phClr">
-                <a:tint val="37000"/>
-                <a:satMod val="300000"/>
-              </a:schemeClr>
-            </a:gs>
-            <a:gs pos="100000">
-              <a:schemeClr val="phClr">
-                <a:tint val="15000"/>
-                <a:satMod val="350000"/>
-              </a:schemeClr>
-            </a:gs>
-          </a:gsLst>
-          <a:lin ang="16200000" scaled="1"/>
-        </a:gradFill>
-        <a:gradFill rotWithShape="1">
-          <a:gsLst>
-            <a:gs pos="0">
-              <a:schemeClr val="phClr">
-                <a:tint val="100000"/>
-                <a:shade val="100000"/>
-                <a:satMod val="130000"/>
-              </a:schemeClr>
-            </a:gs>
-            <a:gs pos="100000">
-              <a:schemeClr val="phClr">
-                <a:tint val="50000"/>
-                <a:shade val="100000"/>
-                <a:satMod val="350000"/>
-              </a:schemeClr>
-            </a:gs>
-          </a:gsLst>
-          <a:lin ang="16200000" scaled="0"/>
-        </a:gradFill>
-      </a:fillStyleLst>
-      <a:lnStyleLst>
-        <a:ln w="9525" cap="flat" cmpd="sng" algn="ctr">
-          <a:solidFill>
-            <a:schemeClr val="phClr">
-              <a:shade val="95000"/>
-              <a:satMod val="105000"/>
-            </a:schemeClr>
-          </a:solidFill>
-          <a:prstDash val="solid"/>
-        </a:ln>
-        <a:ln w="25400" cap="flat" cmpd="sng" algn="ctr">
-          <a:solidFill>
-            <a:schemeClr val="phClr"/>
-          </a:solidFill>
-          <a:prstDash val="solid"/>
-        </a:ln>
-        <a:ln w="38100" cap="flat" cmpd="sng" algn="ctr">
-          <a:solidFill>
-            <a:schemeClr val="phClr"/>
-          </a:solidFill>
-          <a:prstDash val="solid"/>
-        </a:ln>
-      </a:lnStyleLst>
-      <a:effectStyleLst>
-        <a:effectStyle>
-          <a:effectLst>
-            <a:outerShdw blurRad="40000" dist="20000" dir="5400000" rotWithShape="0">
-              <a:srgbClr val="000000">
-                <a:alpha val="38000"/>
-              </a:srgbClr>
-            </a:outerShdw>
-          </a:effectLst>
-        </a:effectStyle>
-        <a:effectStyle>
-          <a:effectLst>
-            <a:outerShdw blurRad="40000" dist="23000" dir="5400000" rotWithShape="0">
-              <a:srgbClr val="000000">
-                <a:alpha val="35000"/>
-              </a:srgbClr>
-            </a:outerShdw>
-          </a:effectLst>
-        </a:effectStyle>
-        <a:effectStyle>
-          <a:effectLst>
-            <a:outerShdw blurRad="40000" dist="23000" dir="5400000" rotWithShape="0">
-              <a:srgbClr val="000000">
-                <a:alpha val="35000"/>
-              </a:srgbClr>
-            </a:outerShdw>
-          </a:effectLst>
-          <a:scene3d>
-            <a:camera prst="orthographicFront">
-              <a:rot lat="0" lon="0" rev="0"/>
-            </a:camera>
-            <a:lightRig rig="threePt" dir="t">
-              <a:rot lat="0" lon="0" rev="1200000"/>
-            </a:lightRig>
-          </a:scene3d>
-          <a:sp3d>
-            <a:bevelT w="63500" h="25400"/>
-          </a:sp3d>
-        </a:effectStyle>
-      </a:effectStyleLst>
-      <a:bgFillStyleLst>
-        <a:solidFill>
-          <a:schemeClr val="phClr"/>
-        </a:solidFill>
-        <a:gradFill rotWithShape="1">
-          <a:gsLst>
-            <a:gs pos="0">
-              <a:schemeClr val="phClr">
-                <a:tint val="40000"/>
-                <a:satMod val="350000"/>
-              </a:schemeClr>
-            </a:gs>
-            <a:gs pos="40000">
-              <a:schemeClr val="phClr">
-                <a:tint val="45000"/>
-                <a:shade val="99000"/>
-                <a:satMod val="350000"/>
-              </a:schemeClr>
-            </a:gs>
-            <a:gs pos="100000">
-              <a:schemeClr val="phClr">
-                <a:shade val="20000"/>
-                <a:satMod val="255000"/>
-              </a:schemeClr>
-            </a:gs>
-          </a:gsLst>
-          <a:path path="circle">
-            <a:fillToRect l="50000" t="-80000" r="50000" b="180000"/>
-          </a:path>
-        </a:gradFill>
-        <a:gradFill rotWithShape="1">
-          <a:gsLst>
-            <a:gs pos="0">
-              <a:schemeClr val="phClr">
-                <a:tint val="80000"/>
-                <a:satMod val="300000"/>
-              </a:schemeClr>
-            </a:gs>
-            <a:gs pos="100000">
-              <a:schemeClr val="phClr">
-                <a:shade val="30000"/>
-                <a:satMod val="200000"/>
-              </a:schemeClr>
-            </a:gs>
-          </a:gsLst>
-          <a:path path="circle">
-            <a:fillToRect l="50000" t="50000" r="50000" b="50000"/>
-          </a:path>
-        </a:gradFill>
-      </a:bgFillStyleLst>
-    </a:fmtScheme>
-  </a:themeElements>
-</a:theme>
-</file>
-
-<file path=ppt/theme/theme4.xml><?xml version="1.0" encoding="utf-8"?>
-<a:theme xmlns:a="http://schemas.openxmlformats.org/drawingml/2006/main" xmlns:r="http://schemas.openxmlformats.org/officeDocument/2006/relationships" name="Geometric">
-  <a:themeElements>
-    <a:clrScheme name="Geometric">
-      <a:dk1>
-        <a:srgbClr val="2A3990"/>
-      </a:dk1>
-      <a:lt1>
-        <a:srgbClr val="FFFFFF"/>
-      </a:lt1>
-      <a:dk2>
-        <a:srgbClr val="434343"/>
-      </a:dk2>
-      <a:lt2>
-        <a:srgbClr val="999999"/>
-      </a:lt2>
-      <a:accent1>
-        <a:srgbClr val="212D74"/>
-      </a:accent1>
-      <a:accent2>
-        <a:srgbClr val="3949AB"/>
-      </a:accent2>
-      <a:accent3>
-        <a:srgbClr val="9C254D"/>
-      </a:accent3>
-      <a:accent4>
-        <a:srgbClr val="D23369"/>
-      </a:accent4>
-      <a:accent5>
-        <a:srgbClr val="F06292"/>
-      </a:accent5>
-      <a:accent6>
-        <a:srgbClr val="7890CD"/>
-      </a:accent6>
-      <a:hlink>
-        <a:srgbClr val="F06292"/>
-      </a:hlink>
-      <a:folHlink>
-        <a:srgbClr val="F06292"/>
-      </a:folHlink>
-    </a:clrScheme>
-    <a:fontScheme name="Office">
-      <a:majorFont>
-        <a:latin typeface="Arial"/>
-        <a:ea typeface=""/>
-        <a:cs typeface=""/>
-        <a:font script="Jpan" typeface="ＭＳ Ｐゴシック"/>
-        <a:font script="Hang" typeface="맑은 고딕"/>
-        <a:font script="Hans" typeface="宋体"/>
-        <a:font script="Hant" typeface="新細明體"/>
-        <a:font script="Arab" typeface="Times New Roman"/>
-        <a:font script="Hebr" typeface="Times New Roman"/>
-        <a:font script="Thai" typeface="Angsana New"/>
-        <a:font script="Ethi" typeface="Nyala"/>
-        <a:font script="Beng" typeface="Vrinda"/>
-        <a:font script="Gujr" typeface="Shruti"/>
-        <a:font script="Khmr" typeface="MoolBoran"/>
-        <a:font script="Knda" typeface="Tunga"/>
-        <a:font script="Guru" typeface="Raavi"/>
-        <a:font script="Cans" typeface="Euphemia"/>
-        <a:font script="Cher" typeface="Plantagenet Cherokee"/>
-        <a:font script="Yiii" typeface="Microsoft Yi Baiti"/>
-        <a:font script="Tibt" typeface="Microsoft Himalaya"/>
-        <a:font script="Thaa" typeface="MV Boli"/>
-        <a:font script="Deva" typeface="Mangal"/>
-        <a:font script="Telu" typeface="Gautami"/>
-        <a:font script="Taml" typeface="Latha"/>
-        <a:font script="Syrc" typeface="Estrangelo Edessa"/>
-        <a:font script="Orya" typeface="Kalinga"/>
-        <a:font script="Mlym" typeface="Kartika"/>
-        <a:font script="Laoo" typeface="DokChampa"/>
-        <a:font script="Sinh" typeface="Iskoola Pota"/>
-        <a:font script="Mong" typeface="Mongolian Baiti"/>
-        <a:font script="Viet" typeface="Times New Roman"/>
-        <a:font script="Uigh" typeface="Microsoft Uighur"/>
-        <a:font script="Geor" typeface="Sylfaen"/>
-      </a:majorFont>
-      <a:minorFont>
-        <a:latin typeface="Arial"/>
-        <a:ea typeface=""/>
-        <a:cs typeface=""/>
-        <a:font script="Jpan" typeface="ＭＳ Ｐゴシック"/>
-        <a:font script="Hang" typeface="맑은 고딕"/>
-        <a:font script="Hans" typeface="宋体"/>
-        <a:font script="Hant" typeface="新細明體"/>
-        <a:font script="Arab" typeface="Arial"/>
-        <a:font script="Hebr" typeface="Arial"/>
-        <a:font script="Thai" typeface="Cordia New"/>
-        <a:font script="Ethi" typeface="Nyala"/>
-        <a:font script="Beng" typeface="Vrinda"/>
-        <a:font script="Gujr" typeface="Shruti"/>
-        <a:font script="Khmr" typeface="DaunPenh"/>
-        <a:font script="Knda" typeface="Tunga"/>
-        <a:font script="Guru" typeface="Raavi"/>
-        <a:font script="Cans" typeface="Euphemia"/>
-        <a:font script="Cher" typeface="Plantagenet Cherokee"/>
-        <a:font script="Yiii" typeface="Microsoft Yi Baiti"/>
-        <a:font script="Tibt" typeface="Microsoft Himalaya"/>
-        <a:font script="Thaa" typeface="MV Boli"/>
-        <a:font script="Deva" typeface="Mangal"/>
-        <a:font script="Telu" typeface="Gautami"/>
-        <a:font script="Taml" typeface="Latha"/>
-        <a:font script="Syrc" typeface="Estrangelo Edessa"/>
-        <a:font script="Orya" typeface="Kalinga"/>
-        <a:font script="Mlym" typeface="Kartika"/>
-        <a:font script="Laoo" typeface="DokChampa"/>
-        <a:font script="Sinh" typeface="Iskoola Pota"/>
-        <a:font script="Mong" typeface="Mongolian Baiti"/>
-        <a:font script="Viet" typeface="Arial"/>
-        <a:font script="Uigh" typeface="Microsoft Uighur"/>
-        <a:font script="Geor" typeface="Sylfaen"/>
-      </a:minorFont>
-    </a:fontScheme>
-    <a:fmtScheme name="Office">
-      <a:fillStyleLst>
-        <a:solidFill>
-          <a:schemeClr val="phClr"/>
-        </a:solidFill>
-        <a:gradFill rotWithShape="1">
-          <a:gsLst>
-            <a:gs pos="0">
-              <a:schemeClr val="phClr">
-                <a:tint val="50000"/>
-                <a:satMod val="300000"/>
-              </a:schemeClr>
-            </a:gs>
-            <a:gs pos="35000">
-              <a:schemeClr val="phClr">
-                <a:tint val="37000"/>
-                <a:satMod val="300000"/>
-              </a:schemeClr>
-            </a:gs>
-            <a:gs pos="100000">
-              <a:schemeClr val="phClr">
-                <a:tint val="15000"/>
-                <a:satMod val="350000"/>
-              </a:schemeClr>
-            </a:gs>
-          </a:gsLst>
-          <a:lin ang="16200000" scaled="1"/>
-        </a:gradFill>
-        <a:gradFill rotWithShape="1">
-          <a:gsLst>
-            <a:gs pos="0">
-              <a:schemeClr val="phClr">
-                <a:tint val="100000"/>
-                <a:shade val="100000"/>
-                <a:satMod val="130000"/>
-              </a:schemeClr>
-            </a:gs>
-            <a:gs pos="100000">
-              <a:schemeClr val="phClr">
-                <a:tint val="50000"/>
-                <a:shade val="100000"/>
-                <a:satMod val="350000"/>
-              </a:schemeClr>
-            </a:gs>
-          </a:gsLst>
-          <a:lin ang="16200000" scaled="0"/>
-        </a:gradFill>
-      </a:fillStyleLst>
-      <a:lnStyleLst>
-        <a:ln w="9525" cap="flat" cmpd="sng" algn="ctr">
-          <a:solidFill>
-            <a:schemeClr val="phClr">
-              <a:shade val="95000"/>
-              <a:satMod val="105000"/>
-            </a:schemeClr>
-          </a:solidFill>
-          <a:prstDash val="solid"/>
-        </a:ln>
-        <a:ln w="25400" cap="flat" cmpd="sng" algn="ctr">
-          <a:solidFill>
-            <a:schemeClr val="phClr"/>
-          </a:solidFill>
-          <a:prstDash val="solid"/>
-        </a:ln>
-        <a:ln w="38100" cap="flat" cmpd="sng" algn="ctr">
-          <a:solidFill>
-            <a:schemeClr val="phClr"/>
-          </a:solidFill>
-          <a:prstDash val="solid"/>
-        </a:ln>
-      </a:lnStyleLst>
-      <a:effectStyleLst>
-        <a:effectStyle>
-          <a:effectLst>
-            <a:outerShdw blurRad="40000" dist="20000" dir="5400000" rotWithShape="0">
-              <a:srgbClr val="000000">
-                <a:alpha val="38000"/>
-              </a:srgbClr>
-            </a:outerShdw>
-          </a:effectLst>
-        </a:effectStyle>
-        <a:effectStyle>
-          <a:effectLst>
-            <a:outerShdw blurRad="40000" dist="23000" dir="5400000" rotWithShape="0">
-              <a:srgbClr val="000000">
-                <a:alpha val="35000"/>
-              </a:srgbClr>
-            </a:outerShdw>
-          </a:effectLst>
-        </a:effectStyle>
-        <a:effectStyle>
-          <a:effectLst>
-            <a:outerShdw blurRad="40000" dist="23000" dir="5400000" rotWithShape="0">
-              <a:srgbClr val="000000">
-                <a:alpha val="35000"/>
-              </a:srgbClr>
-            </a:outerShdw>
-          </a:effectLst>
-          <a:scene3d>
-            <a:camera prst="orthographicFront">
-              <a:rot lat="0" lon="0" rev="0"/>
-            </a:camera>
-            <a:lightRig rig="threePt" dir="t">
-              <a:rot lat="0" lon="0" rev="1200000"/>
-            </a:lightRig>
-          </a:scene3d>
-          <a:sp3d>
-            <a:bevelT w="63500" h="25400"/>
-          </a:sp3d>
-        </a:effectStyle>
-      </a:effectStyleLst>
-      <a:bgFillStyleLst>
-        <a:solidFill>
-          <a:schemeClr val="phClr"/>
-        </a:solidFill>
-        <a:gradFill rotWithShape="1">
-          <a:gsLst>
-            <a:gs pos="0">
-              <a:schemeClr val="phClr">
-                <a:tint val="40000"/>
-                <a:satMod val="350000"/>
-              </a:schemeClr>
-            </a:gs>
-            <a:gs pos="40000">
-              <a:schemeClr val="phClr">
-                <a:tint val="45000"/>
-                <a:shade val="99000"/>
-                <a:satMod val="350000"/>
-              </a:schemeClr>
-            </a:gs>
-            <a:gs pos="100000">
-              <a:schemeClr val="phClr">
-                <a:shade val="20000"/>
-                <a:satMod val="255000"/>
-              </a:schemeClr>
-            </a:gs>
-          </a:gsLst>
-          <a:path path="circle">
-            <a:fillToRect l="50000" t="-80000" r="50000" b="180000"/>
-          </a:path>
-        </a:gradFill>
-        <a:gradFill rotWithShape="1">
-          <a:gsLst>
-            <a:gs pos="0">
-              <a:schemeClr val="phClr">
-                <a:tint val="80000"/>
-                <a:satMod val="300000"/>
-              </a:schemeClr>
-            </a:gs>
-            <a:gs pos="100000">
-              <a:schemeClr val="phClr">
-                <a:shade val="30000"/>
-                <a:satMod val="200000"/>
-              </a:schemeClr>
-            </a:gs>
-          </a:gsLst>
-          <a:path path="circle">
-            <a:fillToRect l="50000" t="50000" r="50000" b="50000"/>
-          </a:path>
-        </a:gradFill>
-      </a:bgFillStyleLst>
-    </a:fmtScheme>
-  </a:themeElements>
-</a:theme>
 </file>
</xml_diff>